<commit_message>
Added table but have doubts
</commit_message>
<xml_diff>
--- a/master_template.pptx
+++ b/master_template.pptx
@@ -9880,49 +9880,4038 @@
           </a:p>
         </p:txBody>
       </p:sp>
-      <p:sp>
-        <p:nvSpPr>
-          <p:cNvPr id="3" name="TextBox 2">
+      <p:graphicFrame>
+        <p:nvGraphicFramePr>
+          <p:cNvPr id="4" name="Table 3">
             <a:extLst>
               <a:ext uri="{FF2B5EF4-FFF2-40B4-BE49-F238E27FC236}">
-                <a16:creationId xmlns:a16="http://schemas.microsoft.com/office/drawing/2014/main" id="{3DB982E2-45EC-00E1-87F1-5279982DE9A4}"/>
+                <a16:creationId xmlns:a16="http://schemas.microsoft.com/office/drawing/2014/main" id="{010EA07D-E885-E5D8-E8E6-D141A56152EA}"/>
               </a:ext>
             </a:extLst>
           </p:cNvPr>
-          <p:cNvSpPr txBox="1"/>
+          <p:cNvGraphicFramePr>
+            <a:graphicFrameLocks noGrp="1"/>
+          </p:cNvGraphicFramePr>
+          <p:nvPr>
+            <p:extLst>
+              <p:ext uri="{D42A27DB-BD31-4B8C-83A1-F6EECF244321}">
+                <p14:modId xmlns:p14="http://schemas.microsoft.com/office/powerpoint/2010/main" val="4202596862"/>
+              </p:ext>
+            </p:extLst>
+          </p:nvPr>
+        </p:nvGraphicFramePr>
+        <p:xfrm>
+          <a:off x="4962525" y="1646445"/>
+          <a:ext cx="3867150" cy="3124280"/>
+        </p:xfrm>
+        <a:graphic>
+          <a:graphicData uri="http://schemas.openxmlformats.org/drawingml/2006/table">
+            <a:tbl>
+              <a:tblPr/>
+              <a:tblGrid>
+                <a:gridCol w="769262">
+                  <a:extLst>
+                    <a:ext uri="{9D8B030D-6E8A-4147-A177-3AD203B41FA5}">
+                      <a16:colId xmlns:a16="http://schemas.microsoft.com/office/drawing/2014/main" val="1069966037"/>
+                    </a:ext>
+                  </a:extLst>
+                </a:gridCol>
+                <a:gridCol w="612722">
+                  <a:extLst>
+                    <a:ext uri="{9D8B030D-6E8A-4147-A177-3AD203B41FA5}">
+                      <a16:colId xmlns:a16="http://schemas.microsoft.com/office/drawing/2014/main" val="3993124200"/>
+                    </a:ext>
+                  </a:extLst>
+                </a:gridCol>
+                <a:gridCol w="612722">
+                  <a:extLst>
+                    <a:ext uri="{9D8B030D-6E8A-4147-A177-3AD203B41FA5}">
+                      <a16:colId xmlns:a16="http://schemas.microsoft.com/office/drawing/2014/main" val="2304610044"/>
+                    </a:ext>
+                  </a:extLst>
+                </a:gridCol>
+                <a:gridCol w="612722">
+                  <a:extLst>
+                    <a:ext uri="{9D8B030D-6E8A-4147-A177-3AD203B41FA5}">
+                      <a16:colId xmlns:a16="http://schemas.microsoft.com/office/drawing/2014/main" val="2954385777"/>
+                    </a:ext>
+                  </a:extLst>
+                </a:gridCol>
+                <a:gridCol w="612722">
+                  <a:extLst>
+                    <a:ext uri="{9D8B030D-6E8A-4147-A177-3AD203B41FA5}">
+                      <a16:colId xmlns:a16="http://schemas.microsoft.com/office/drawing/2014/main" val="2937344670"/>
+                    </a:ext>
+                  </a:extLst>
+                </a:gridCol>
+                <a:gridCol w="647000">
+                  <a:extLst>
+                    <a:ext uri="{9D8B030D-6E8A-4147-A177-3AD203B41FA5}">
+                      <a16:colId xmlns:a16="http://schemas.microsoft.com/office/drawing/2014/main" val="1580030156"/>
+                    </a:ext>
+                  </a:extLst>
+                </a:gridCol>
+              </a:tblGrid>
+              <a:tr h="273457">
+                <a:tc>
+                  <a:txBody>
+                    <a:bodyPr/>
+                    <a:lstStyle/>
+                    <a:p>
+                      <a:pPr rtl="0" fontAlgn="t">
+                        <a:buNone/>
+                      </a:pPr>
+                      <a:r>
+                        <a:rPr lang="en-IN" sz="600" b="1" i="0" u="none" strike="noStrike">
+                          <a:solidFill>
+                            <a:schemeClr val="tx1"/>
+                          </a:solidFill>
+                          <a:effectLst/>
+                          <a:latin typeface="Calibri" panose="020F0502020204030204" pitchFamily="34" charset="0"/>
+                        </a:rPr>
+                        <a:t>Particulars</a:t>
+                      </a:r>
+                      <a:endParaRPr lang="en-IN">
+                        <a:solidFill>
+                          <a:schemeClr val="tx1"/>
+                        </a:solidFill>
+                        <a:effectLst/>
+                      </a:endParaRPr>
+                    </a:p>
+                  </a:txBody>
+                  <a:tcPr marL="95250" marR="95250" marT="95250" marB="95250">
+                    <a:lnL w="9525" cap="flat" cmpd="sng" algn="ctr">
+                      <a:solidFill>
+                        <a:srgbClr val="9E9E9E"/>
+                      </a:solidFill>
+                      <a:prstDash val="solid"/>
+                      <a:round/>
+                      <a:headEnd type="none" w="med" len="med"/>
+                      <a:tailEnd type="none" w="med" len="med"/>
+                    </a:lnL>
+                    <a:lnR w="9525" cap="flat" cmpd="sng" algn="ctr">
+                      <a:solidFill>
+                        <a:srgbClr val="9E9E9E"/>
+                      </a:solidFill>
+                      <a:prstDash val="solid"/>
+                      <a:round/>
+                      <a:headEnd type="none" w="med" len="med"/>
+                      <a:tailEnd type="none" w="med" len="med"/>
+                    </a:lnR>
+                    <a:lnT w="9525" cap="flat" cmpd="sng" algn="ctr">
+                      <a:solidFill>
+                        <a:srgbClr val="9E9E9E"/>
+                      </a:solidFill>
+                      <a:prstDash val="solid"/>
+                      <a:round/>
+                      <a:headEnd type="none" w="med" len="med"/>
+                      <a:tailEnd type="none" w="med" len="med"/>
+                    </a:lnT>
+                    <a:lnB w="9525" cap="flat" cmpd="sng" algn="ctr">
+                      <a:solidFill>
+                        <a:srgbClr val="9E9E9E"/>
+                      </a:solidFill>
+                      <a:prstDash val="solid"/>
+                      <a:round/>
+                      <a:headEnd type="none" w="med" len="med"/>
+                      <a:tailEnd type="none" w="med" len="med"/>
+                    </a:lnB>
+                    <a:solidFill>
+                      <a:srgbClr val="1F4690"/>
+                    </a:solidFill>
+                  </a:tcPr>
+                </a:tc>
+                <a:tc>
+                  <a:txBody>
+                    <a:bodyPr/>
+                    <a:lstStyle/>
+                    <a:p>
+                      <a:pPr algn="r" rtl="0" fontAlgn="ctr">
+                        <a:buNone/>
+                      </a:pPr>
+                      <a:r>
+                        <a:rPr lang="en-IN" sz="600" b="1" i="0" u="none" strike="noStrike">
+                          <a:solidFill>
+                            <a:schemeClr val="tx1"/>
+                          </a:solidFill>
+                          <a:effectLst/>
+                          <a:latin typeface="Calibri" panose="020F0502020204030204" pitchFamily="34" charset="0"/>
+                        </a:rPr>
+                        <a:t>FY24A</a:t>
+                      </a:r>
+                      <a:endParaRPr lang="en-IN">
+                        <a:solidFill>
+                          <a:schemeClr val="tx1"/>
+                        </a:solidFill>
+                        <a:effectLst/>
+                      </a:endParaRPr>
+                    </a:p>
+                  </a:txBody>
+                  <a:tcPr marL="95250" marR="95250" marT="95250" marB="95250" anchor="ctr">
+                    <a:lnL w="9525" cap="flat" cmpd="sng" algn="ctr">
+                      <a:solidFill>
+                        <a:srgbClr val="9E9E9E"/>
+                      </a:solidFill>
+                      <a:prstDash val="solid"/>
+                      <a:round/>
+                      <a:headEnd type="none" w="med" len="med"/>
+                      <a:tailEnd type="none" w="med" len="med"/>
+                    </a:lnL>
+                    <a:lnR w="9525" cap="flat" cmpd="sng" algn="ctr">
+                      <a:solidFill>
+                        <a:srgbClr val="9E9E9E"/>
+                      </a:solidFill>
+                      <a:prstDash val="solid"/>
+                      <a:round/>
+                      <a:headEnd type="none" w="med" len="med"/>
+                      <a:tailEnd type="none" w="med" len="med"/>
+                    </a:lnR>
+                    <a:lnT w="9525" cap="flat" cmpd="sng" algn="ctr">
+                      <a:solidFill>
+                        <a:srgbClr val="9E9E9E"/>
+                      </a:solidFill>
+                      <a:prstDash val="solid"/>
+                      <a:round/>
+                      <a:headEnd type="none" w="med" len="med"/>
+                      <a:tailEnd type="none" w="med" len="med"/>
+                    </a:lnT>
+                    <a:lnB w="9525" cap="flat" cmpd="sng" algn="ctr">
+                      <a:solidFill>
+                        <a:srgbClr val="9E9E9E"/>
+                      </a:solidFill>
+                      <a:prstDash val="solid"/>
+                      <a:round/>
+                      <a:headEnd type="none" w="med" len="med"/>
+                      <a:tailEnd type="none" w="med" len="med"/>
+                    </a:lnB>
+                    <a:solidFill>
+                      <a:srgbClr val="1F4690"/>
+                    </a:solidFill>
+                  </a:tcPr>
+                </a:tc>
+                <a:tc>
+                  <a:txBody>
+                    <a:bodyPr/>
+                    <a:lstStyle/>
+                    <a:p>
+                      <a:pPr algn="r" rtl="0" fontAlgn="ctr">
+                        <a:buNone/>
+                      </a:pPr>
+                      <a:r>
+                        <a:rPr lang="en-IN" sz="600" b="1" i="0" u="none" strike="noStrike">
+                          <a:solidFill>
+                            <a:schemeClr val="tx1"/>
+                          </a:solidFill>
+                          <a:effectLst/>
+                          <a:latin typeface="Calibri" panose="020F0502020204030204" pitchFamily="34" charset="0"/>
+                        </a:rPr>
+                        <a:t>FY25A</a:t>
+                      </a:r>
+                      <a:endParaRPr lang="en-IN">
+                        <a:solidFill>
+                          <a:schemeClr val="tx1"/>
+                        </a:solidFill>
+                        <a:effectLst/>
+                      </a:endParaRPr>
+                    </a:p>
+                  </a:txBody>
+                  <a:tcPr marL="95250" marR="95250" marT="95250" marB="95250" anchor="ctr">
+                    <a:lnL w="9525" cap="flat" cmpd="sng" algn="ctr">
+                      <a:solidFill>
+                        <a:srgbClr val="9E9E9E"/>
+                      </a:solidFill>
+                      <a:prstDash val="solid"/>
+                      <a:round/>
+                      <a:headEnd type="none" w="med" len="med"/>
+                      <a:tailEnd type="none" w="med" len="med"/>
+                    </a:lnL>
+                    <a:lnR w="9525" cap="flat" cmpd="sng" algn="ctr">
+                      <a:solidFill>
+                        <a:srgbClr val="9E9E9E"/>
+                      </a:solidFill>
+                      <a:prstDash val="solid"/>
+                      <a:round/>
+                      <a:headEnd type="none" w="med" len="med"/>
+                      <a:tailEnd type="none" w="med" len="med"/>
+                    </a:lnR>
+                    <a:lnT w="9525" cap="flat" cmpd="sng" algn="ctr">
+                      <a:solidFill>
+                        <a:srgbClr val="9E9E9E"/>
+                      </a:solidFill>
+                      <a:prstDash val="solid"/>
+                      <a:round/>
+                      <a:headEnd type="none" w="med" len="med"/>
+                      <a:tailEnd type="none" w="med" len="med"/>
+                    </a:lnT>
+                    <a:lnB w="9525" cap="flat" cmpd="sng" algn="ctr">
+                      <a:solidFill>
+                        <a:srgbClr val="9E9E9E"/>
+                      </a:solidFill>
+                      <a:prstDash val="solid"/>
+                      <a:round/>
+                      <a:headEnd type="none" w="med" len="med"/>
+                      <a:tailEnd type="none" w="med" len="med"/>
+                    </a:lnB>
+                    <a:solidFill>
+                      <a:srgbClr val="1F4690"/>
+                    </a:solidFill>
+                  </a:tcPr>
+                </a:tc>
+                <a:tc>
+                  <a:txBody>
+                    <a:bodyPr/>
+                    <a:lstStyle/>
+                    <a:p>
+                      <a:pPr algn="r" rtl="0" fontAlgn="ctr">
+                        <a:buNone/>
+                      </a:pPr>
+                      <a:r>
+                        <a:rPr lang="en-IN" sz="600" b="1" i="0" u="none" strike="noStrike">
+                          <a:solidFill>
+                            <a:schemeClr val="tx1"/>
+                          </a:solidFill>
+                          <a:effectLst/>
+                          <a:latin typeface="Calibri" panose="020F0502020204030204" pitchFamily="34" charset="0"/>
+                        </a:rPr>
+                        <a:t>FY26E</a:t>
+                      </a:r>
+                      <a:endParaRPr lang="en-IN">
+                        <a:solidFill>
+                          <a:schemeClr val="tx1"/>
+                        </a:solidFill>
+                        <a:effectLst/>
+                      </a:endParaRPr>
+                    </a:p>
+                  </a:txBody>
+                  <a:tcPr marL="95250" marR="95250" marT="95250" marB="95250" anchor="ctr">
+                    <a:lnL w="9525" cap="flat" cmpd="sng" algn="ctr">
+                      <a:solidFill>
+                        <a:srgbClr val="9E9E9E"/>
+                      </a:solidFill>
+                      <a:prstDash val="solid"/>
+                      <a:round/>
+                      <a:headEnd type="none" w="med" len="med"/>
+                      <a:tailEnd type="none" w="med" len="med"/>
+                    </a:lnL>
+                    <a:lnR w="9525" cap="flat" cmpd="sng" algn="ctr">
+                      <a:solidFill>
+                        <a:srgbClr val="9E9E9E"/>
+                      </a:solidFill>
+                      <a:prstDash val="solid"/>
+                      <a:round/>
+                      <a:headEnd type="none" w="med" len="med"/>
+                      <a:tailEnd type="none" w="med" len="med"/>
+                    </a:lnR>
+                    <a:lnT w="9525" cap="flat" cmpd="sng" algn="ctr">
+                      <a:solidFill>
+                        <a:srgbClr val="9E9E9E"/>
+                      </a:solidFill>
+                      <a:prstDash val="solid"/>
+                      <a:round/>
+                      <a:headEnd type="none" w="med" len="med"/>
+                      <a:tailEnd type="none" w="med" len="med"/>
+                    </a:lnT>
+                    <a:lnB w="9525" cap="flat" cmpd="sng" algn="ctr">
+                      <a:solidFill>
+                        <a:srgbClr val="9E9E9E"/>
+                      </a:solidFill>
+                      <a:prstDash val="solid"/>
+                      <a:round/>
+                      <a:headEnd type="none" w="med" len="med"/>
+                      <a:tailEnd type="none" w="med" len="med"/>
+                    </a:lnB>
+                    <a:solidFill>
+                      <a:srgbClr val="1F4690"/>
+                    </a:solidFill>
+                  </a:tcPr>
+                </a:tc>
+                <a:tc>
+                  <a:txBody>
+                    <a:bodyPr/>
+                    <a:lstStyle/>
+                    <a:p>
+                      <a:pPr algn="r" rtl="0" fontAlgn="ctr">
+                        <a:buNone/>
+                      </a:pPr>
+                      <a:r>
+                        <a:rPr lang="en-IN" sz="600" b="1" i="0" u="none" strike="noStrike">
+                          <a:solidFill>
+                            <a:schemeClr val="tx1"/>
+                          </a:solidFill>
+                          <a:effectLst/>
+                          <a:latin typeface="Calibri" panose="020F0502020204030204" pitchFamily="34" charset="0"/>
+                        </a:rPr>
+                        <a:t>FY27E</a:t>
+                      </a:r>
+                      <a:endParaRPr lang="en-IN">
+                        <a:solidFill>
+                          <a:schemeClr val="tx1"/>
+                        </a:solidFill>
+                        <a:effectLst/>
+                      </a:endParaRPr>
+                    </a:p>
+                  </a:txBody>
+                  <a:tcPr marL="95250" marR="95250" marT="95250" marB="95250" anchor="ctr">
+                    <a:lnL w="9525" cap="flat" cmpd="sng" algn="ctr">
+                      <a:solidFill>
+                        <a:srgbClr val="9E9E9E"/>
+                      </a:solidFill>
+                      <a:prstDash val="solid"/>
+                      <a:round/>
+                      <a:headEnd type="none" w="med" len="med"/>
+                      <a:tailEnd type="none" w="med" len="med"/>
+                    </a:lnL>
+                    <a:lnR w="9525" cap="flat" cmpd="sng" algn="ctr">
+                      <a:solidFill>
+                        <a:srgbClr val="9E9E9E"/>
+                      </a:solidFill>
+                      <a:prstDash val="solid"/>
+                      <a:round/>
+                      <a:headEnd type="none" w="med" len="med"/>
+                      <a:tailEnd type="none" w="med" len="med"/>
+                    </a:lnR>
+                    <a:lnT w="9525" cap="flat" cmpd="sng" algn="ctr">
+                      <a:solidFill>
+                        <a:srgbClr val="9E9E9E"/>
+                      </a:solidFill>
+                      <a:prstDash val="solid"/>
+                      <a:round/>
+                      <a:headEnd type="none" w="med" len="med"/>
+                      <a:tailEnd type="none" w="med" len="med"/>
+                    </a:lnT>
+                    <a:lnB w="9525" cap="flat" cmpd="sng" algn="ctr">
+                      <a:solidFill>
+                        <a:srgbClr val="9E9E9E"/>
+                      </a:solidFill>
+                      <a:prstDash val="solid"/>
+                      <a:round/>
+                      <a:headEnd type="none" w="med" len="med"/>
+                      <a:tailEnd type="none" w="med" len="med"/>
+                    </a:lnB>
+                    <a:solidFill>
+                      <a:srgbClr val="1F4690"/>
+                    </a:solidFill>
+                  </a:tcPr>
+                </a:tc>
+                <a:tc>
+                  <a:txBody>
+                    <a:bodyPr/>
+                    <a:lstStyle/>
+                    <a:p>
+                      <a:pPr algn="r" rtl="0" fontAlgn="ctr">
+                        <a:buNone/>
+                      </a:pPr>
+                      <a:r>
+                        <a:rPr lang="en-IN" sz="600" b="1" i="0" u="none" strike="noStrike">
+                          <a:solidFill>
+                            <a:schemeClr val="tx1"/>
+                          </a:solidFill>
+                          <a:effectLst/>
+                          <a:latin typeface="Calibri" panose="020F0502020204030204" pitchFamily="34" charset="0"/>
+                        </a:rPr>
+                        <a:t>FY28E</a:t>
+                      </a:r>
+                      <a:endParaRPr lang="en-IN">
+                        <a:solidFill>
+                          <a:schemeClr val="tx1"/>
+                        </a:solidFill>
+                        <a:effectLst/>
+                      </a:endParaRPr>
+                    </a:p>
+                  </a:txBody>
+                  <a:tcPr marL="95250" marR="95250" marT="95250" marB="95250" anchor="ctr">
+                    <a:lnL w="9525" cap="flat" cmpd="sng" algn="ctr">
+                      <a:solidFill>
+                        <a:srgbClr val="9E9E9E"/>
+                      </a:solidFill>
+                      <a:prstDash val="solid"/>
+                      <a:round/>
+                      <a:headEnd type="none" w="med" len="med"/>
+                      <a:tailEnd type="none" w="med" len="med"/>
+                    </a:lnL>
+                    <a:lnR w="9525" cap="flat" cmpd="sng" algn="ctr">
+                      <a:solidFill>
+                        <a:srgbClr val="9E9E9E"/>
+                      </a:solidFill>
+                      <a:prstDash val="solid"/>
+                      <a:round/>
+                      <a:headEnd type="none" w="med" len="med"/>
+                      <a:tailEnd type="none" w="med" len="med"/>
+                    </a:lnR>
+                    <a:lnT w="9525" cap="flat" cmpd="sng" algn="ctr">
+                      <a:solidFill>
+                        <a:srgbClr val="9E9E9E"/>
+                      </a:solidFill>
+                      <a:prstDash val="solid"/>
+                      <a:round/>
+                      <a:headEnd type="none" w="med" len="med"/>
+                      <a:tailEnd type="none" w="med" len="med"/>
+                    </a:lnT>
+                    <a:lnB w="9525" cap="flat" cmpd="sng" algn="ctr">
+                      <a:solidFill>
+                        <a:srgbClr val="9E9E9E"/>
+                      </a:solidFill>
+                      <a:prstDash val="solid"/>
+                      <a:round/>
+                      <a:headEnd type="none" w="med" len="med"/>
+                      <a:tailEnd type="none" w="med" len="med"/>
+                    </a:lnB>
+                    <a:solidFill>
+                      <a:srgbClr val="1F4690"/>
+                    </a:solidFill>
+                  </a:tcPr>
+                </a:tc>
+                <a:extLst>
+                  <a:ext uri="{0D108BD9-81ED-4DB2-BD59-A6C34878D82A}">
+                    <a16:rowId xmlns:a16="http://schemas.microsoft.com/office/drawing/2014/main" val="518340034"/>
+                  </a:ext>
+                </a:extLst>
+              </a:tr>
+              <a:tr h="362146">
+                <a:tc>
+                  <a:txBody>
+                    <a:bodyPr/>
+                    <a:lstStyle/>
+                    <a:p>
+                      <a:pPr rtl="0" fontAlgn="t">
+                        <a:buNone/>
+                      </a:pPr>
+                      <a:r>
+                        <a:rPr lang="en-IN" sz="600" b="0" i="0" u="none" strike="noStrike">
+                          <a:solidFill>
+                            <a:schemeClr val="tx1"/>
+                          </a:solidFill>
+                          <a:effectLst/>
+                          <a:latin typeface="Calibri" panose="020F0502020204030204" pitchFamily="34" charset="0"/>
+                        </a:rPr>
+                        <a:t>Sales</a:t>
+                      </a:r>
+                      <a:endParaRPr lang="en-IN">
+                        <a:solidFill>
+                          <a:schemeClr val="tx1"/>
+                        </a:solidFill>
+                        <a:effectLst/>
+                      </a:endParaRPr>
+                    </a:p>
+                  </a:txBody>
+                  <a:tcPr marL="95250" marR="95250" marT="95250" marB="95250">
+                    <a:lnL w="9525" cap="flat" cmpd="sng" algn="ctr">
+                      <a:solidFill>
+                        <a:srgbClr val="9E9E9E"/>
+                      </a:solidFill>
+                      <a:prstDash val="solid"/>
+                      <a:round/>
+                      <a:headEnd type="none" w="med" len="med"/>
+                      <a:tailEnd type="none" w="med" len="med"/>
+                    </a:lnL>
+                    <a:lnR w="9525" cap="flat" cmpd="sng" algn="ctr">
+                      <a:solidFill>
+                        <a:srgbClr val="9E9E9E"/>
+                      </a:solidFill>
+                      <a:prstDash val="solid"/>
+                      <a:round/>
+                      <a:headEnd type="none" w="med" len="med"/>
+                      <a:tailEnd type="none" w="med" len="med"/>
+                    </a:lnR>
+                    <a:lnT w="9525" cap="flat" cmpd="sng" algn="ctr">
+                      <a:solidFill>
+                        <a:srgbClr val="9E9E9E"/>
+                      </a:solidFill>
+                      <a:prstDash val="solid"/>
+                      <a:round/>
+                      <a:headEnd type="none" w="med" len="med"/>
+                      <a:tailEnd type="none" w="med" len="med"/>
+                    </a:lnT>
+                    <a:lnB w="9525" cap="flat" cmpd="sng" algn="ctr">
+                      <a:solidFill>
+                        <a:srgbClr val="9E9E9E"/>
+                      </a:solidFill>
+                      <a:prstDash val="solid"/>
+                      <a:round/>
+                      <a:headEnd type="none" w="med" len="med"/>
+                      <a:tailEnd type="none" w="med" len="med"/>
+                    </a:lnB>
+                    <a:noFill/>
+                  </a:tcPr>
+                </a:tc>
+                <a:tc>
+                  <a:txBody>
+                    <a:bodyPr/>
+                    <a:lstStyle/>
+                    <a:p>
+                      <a:pPr algn="r" rtl="0" fontAlgn="ctr">
+                        <a:buNone/>
+                      </a:pPr>
+                      <a:r>
+                        <a:rPr lang="en-IN" sz="600" b="0" i="0" u="none" strike="noStrike" dirty="0">
+                          <a:solidFill>
+                            <a:schemeClr val="tx1"/>
+                          </a:solidFill>
+                          <a:effectLst/>
+                          <a:latin typeface="Calibri" panose="020F0502020204030204" pitchFamily="34" charset="0"/>
+                        </a:rPr>
+                        <a:t>{{revenue_fy24}}</a:t>
+                      </a:r>
+                      <a:endParaRPr lang="en-IN" dirty="0">
+                        <a:solidFill>
+                          <a:schemeClr val="tx1"/>
+                        </a:solidFill>
+                        <a:effectLst/>
+                      </a:endParaRPr>
+                    </a:p>
+                  </a:txBody>
+                  <a:tcPr marL="95250" marR="95250" marT="95250" marB="95250" anchor="ctr">
+                    <a:lnL w="9525" cap="flat" cmpd="sng" algn="ctr">
+                      <a:solidFill>
+                        <a:srgbClr val="9E9E9E"/>
+                      </a:solidFill>
+                      <a:prstDash val="solid"/>
+                      <a:round/>
+                      <a:headEnd type="none" w="med" len="med"/>
+                      <a:tailEnd type="none" w="med" len="med"/>
+                    </a:lnL>
+                    <a:lnR w="9525" cap="flat" cmpd="sng" algn="ctr">
+                      <a:solidFill>
+                        <a:srgbClr val="9E9E9E"/>
+                      </a:solidFill>
+                      <a:prstDash val="solid"/>
+                      <a:round/>
+                      <a:headEnd type="none" w="med" len="med"/>
+                      <a:tailEnd type="none" w="med" len="med"/>
+                    </a:lnR>
+                    <a:lnT w="9525" cap="flat" cmpd="sng" algn="ctr">
+                      <a:solidFill>
+                        <a:srgbClr val="9E9E9E"/>
+                      </a:solidFill>
+                      <a:prstDash val="solid"/>
+                      <a:round/>
+                      <a:headEnd type="none" w="med" len="med"/>
+                      <a:tailEnd type="none" w="med" len="med"/>
+                    </a:lnT>
+                    <a:lnB w="9525" cap="flat" cmpd="sng" algn="ctr">
+                      <a:solidFill>
+                        <a:srgbClr val="9E9E9E"/>
+                      </a:solidFill>
+                      <a:prstDash val="solid"/>
+                      <a:round/>
+                      <a:headEnd type="none" w="med" len="med"/>
+                      <a:tailEnd type="none" w="med" len="med"/>
+                    </a:lnB>
+                    <a:noFill/>
+                  </a:tcPr>
+                </a:tc>
+                <a:tc>
+                  <a:txBody>
+                    <a:bodyPr/>
+                    <a:lstStyle/>
+                    <a:p>
+                      <a:pPr algn="r" rtl="0" fontAlgn="ctr">
+                        <a:buNone/>
+                      </a:pPr>
+                      <a:r>
+                        <a:rPr lang="en-IN" sz="600" b="0" i="0" u="none" strike="noStrike" dirty="0">
+                          <a:solidFill>
+                            <a:schemeClr val="tx1"/>
+                          </a:solidFill>
+                          <a:effectLst/>
+                          <a:latin typeface="Calibri" panose="020F0502020204030204" pitchFamily="34" charset="0"/>
+                        </a:rPr>
+                        <a:t>{{revenue_fy25}}</a:t>
+                      </a:r>
+                      <a:endParaRPr lang="en-IN" dirty="0">
+                        <a:solidFill>
+                          <a:schemeClr val="tx1"/>
+                        </a:solidFill>
+                        <a:effectLst/>
+                      </a:endParaRPr>
+                    </a:p>
+                  </a:txBody>
+                  <a:tcPr marL="95250" marR="95250" marT="95250" marB="95250" anchor="ctr">
+                    <a:lnL w="9525" cap="flat" cmpd="sng" algn="ctr">
+                      <a:solidFill>
+                        <a:srgbClr val="9E9E9E"/>
+                      </a:solidFill>
+                      <a:prstDash val="solid"/>
+                      <a:round/>
+                      <a:headEnd type="none" w="med" len="med"/>
+                      <a:tailEnd type="none" w="med" len="med"/>
+                    </a:lnL>
+                    <a:lnR w="9525" cap="flat" cmpd="sng" algn="ctr">
+                      <a:solidFill>
+                        <a:srgbClr val="9E9E9E"/>
+                      </a:solidFill>
+                      <a:prstDash val="solid"/>
+                      <a:round/>
+                      <a:headEnd type="none" w="med" len="med"/>
+                      <a:tailEnd type="none" w="med" len="med"/>
+                    </a:lnR>
+                    <a:lnT w="9525" cap="flat" cmpd="sng" algn="ctr">
+                      <a:solidFill>
+                        <a:srgbClr val="9E9E9E"/>
+                      </a:solidFill>
+                      <a:prstDash val="solid"/>
+                      <a:round/>
+                      <a:headEnd type="none" w="med" len="med"/>
+                      <a:tailEnd type="none" w="med" len="med"/>
+                    </a:lnT>
+                    <a:lnB w="9525" cap="flat" cmpd="sng" algn="ctr">
+                      <a:solidFill>
+                        <a:srgbClr val="9E9E9E"/>
+                      </a:solidFill>
+                      <a:prstDash val="solid"/>
+                      <a:round/>
+                      <a:headEnd type="none" w="med" len="med"/>
+                      <a:tailEnd type="none" w="med" len="med"/>
+                    </a:lnB>
+                    <a:noFill/>
+                  </a:tcPr>
+                </a:tc>
+                <a:tc>
+                  <a:txBody>
+                    <a:bodyPr/>
+                    <a:lstStyle/>
+                    <a:p>
+                      <a:pPr algn="r" rtl="0" fontAlgn="ctr">
+                        <a:buNone/>
+                      </a:pPr>
+                      <a:r>
+                        <a:rPr lang="en-IN" sz="600" b="0" i="0" u="none" strike="noStrike" dirty="0">
+                          <a:solidFill>
+                            <a:schemeClr val="tx1"/>
+                          </a:solidFill>
+                          <a:effectLst/>
+                          <a:latin typeface="Calibri" panose="020F0502020204030204" pitchFamily="34" charset="0"/>
+                        </a:rPr>
+                        <a:t>{{revenue_fy26}}</a:t>
+                      </a:r>
+                      <a:endParaRPr lang="en-IN" dirty="0">
+                        <a:solidFill>
+                          <a:schemeClr val="tx1"/>
+                        </a:solidFill>
+                        <a:effectLst/>
+                      </a:endParaRPr>
+                    </a:p>
+                  </a:txBody>
+                  <a:tcPr marL="95250" marR="95250" marT="95250" marB="95250" anchor="ctr">
+                    <a:lnL w="9525" cap="flat" cmpd="sng" algn="ctr">
+                      <a:solidFill>
+                        <a:srgbClr val="9E9E9E"/>
+                      </a:solidFill>
+                      <a:prstDash val="solid"/>
+                      <a:round/>
+                      <a:headEnd type="none" w="med" len="med"/>
+                      <a:tailEnd type="none" w="med" len="med"/>
+                    </a:lnL>
+                    <a:lnR w="9525" cap="flat" cmpd="sng" algn="ctr">
+                      <a:solidFill>
+                        <a:srgbClr val="9E9E9E"/>
+                      </a:solidFill>
+                      <a:prstDash val="solid"/>
+                      <a:round/>
+                      <a:headEnd type="none" w="med" len="med"/>
+                      <a:tailEnd type="none" w="med" len="med"/>
+                    </a:lnR>
+                    <a:lnT w="9525" cap="flat" cmpd="sng" algn="ctr">
+                      <a:solidFill>
+                        <a:srgbClr val="9E9E9E"/>
+                      </a:solidFill>
+                      <a:prstDash val="solid"/>
+                      <a:round/>
+                      <a:headEnd type="none" w="med" len="med"/>
+                      <a:tailEnd type="none" w="med" len="med"/>
+                    </a:lnT>
+                    <a:lnB w="9525" cap="flat" cmpd="sng" algn="ctr">
+                      <a:solidFill>
+                        <a:srgbClr val="9E9E9E"/>
+                      </a:solidFill>
+                      <a:prstDash val="solid"/>
+                      <a:round/>
+                      <a:headEnd type="none" w="med" len="med"/>
+                      <a:tailEnd type="none" w="med" len="med"/>
+                    </a:lnB>
+                    <a:noFill/>
+                  </a:tcPr>
+                </a:tc>
+                <a:tc>
+                  <a:txBody>
+                    <a:bodyPr/>
+                    <a:lstStyle/>
+                    <a:p>
+                      <a:pPr algn="r" rtl="0" fontAlgn="ctr">
+                        <a:buNone/>
+                      </a:pPr>
+                      <a:r>
+                        <a:rPr lang="en-IN" sz="600" b="0" i="0" u="none" strike="noStrike" dirty="0">
+                          <a:solidFill>
+                            <a:schemeClr val="tx1"/>
+                          </a:solidFill>
+                          <a:effectLst/>
+                          <a:latin typeface="Calibri" panose="020F0502020204030204" pitchFamily="34" charset="0"/>
+                        </a:rPr>
+                        <a:t>{{revenue_fy27}}</a:t>
+                      </a:r>
+                      <a:endParaRPr lang="en-IN" dirty="0">
+                        <a:solidFill>
+                          <a:schemeClr val="tx1"/>
+                        </a:solidFill>
+                        <a:effectLst/>
+                      </a:endParaRPr>
+                    </a:p>
+                  </a:txBody>
+                  <a:tcPr marL="95250" marR="95250" marT="95250" marB="95250" anchor="ctr">
+                    <a:lnL w="9525" cap="flat" cmpd="sng" algn="ctr">
+                      <a:solidFill>
+                        <a:srgbClr val="9E9E9E"/>
+                      </a:solidFill>
+                      <a:prstDash val="solid"/>
+                      <a:round/>
+                      <a:headEnd type="none" w="med" len="med"/>
+                      <a:tailEnd type="none" w="med" len="med"/>
+                    </a:lnL>
+                    <a:lnR w="9525" cap="flat" cmpd="sng" algn="ctr">
+                      <a:solidFill>
+                        <a:srgbClr val="9E9E9E"/>
+                      </a:solidFill>
+                      <a:prstDash val="solid"/>
+                      <a:round/>
+                      <a:headEnd type="none" w="med" len="med"/>
+                      <a:tailEnd type="none" w="med" len="med"/>
+                    </a:lnR>
+                    <a:lnT w="9525" cap="flat" cmpd="sng" algn="ctr">
+                      <a:solidFill>
+                        <a:srgbClr val="9E9E9E"/>
+                      </a:solidFill>
+                      <a:prstDash val="solid"/>
+                      <a:round/>
+                      <a:headEnd type="none" w="med" len="med"/>
+                      <a:tailEnd type="none" w="med" len="med"/>
+                    </a:lnT>
+                    <a:lnB w="9525" cap="flat" cmpd="sng" algn="ctr">
+                      <a:solidFill>
+                        <a:srgbClr val="9E9E9E"/>
+                      </a:solidFill>
+                      <a:prstDash val="solid"/>
+                      <a:round/>
+                      <a:headEnd type="none" w="med" len="med"/>
+                      <a:tailEnd type="none" w="med" len="med"/>
+                    </a:lnB>
+                    <a:noFill/>
+                  </a:tcPr>
+                </a:tc>
+                <a:tc>
+                  <a:txBody>
+                    <a:bodyPr/>
+                    <a:lstStyle/>
+                    <a:p>
+                      <a:pPr algn="r" rtl="0" fontAlgn="ctr">
+                        <a:buNone/>
+                      </a:pPr>
+                      <a:r>
+                        <a:rPr lang="en-IN" sz="600" b="0" i="0" u="none" strike="noStrike" dirty="0">
+                          <a:solidFill>
+                            <a:schemeClr val="tx1"/>
+                          </a:solidFill>
+                          <a:effectLst/>
+                          <a:latin typeface="Calibri" panose="020F0502020204030204" pitchFamily="34" charset="0"/>
+                        </a:rPr>
+                        <a:t>{{revenue_fy28}}</a:t>
+                      </a:r>
+                      <a:endParaRPr lang="en-IN" dirty="0">
+                        <a:solidFill>
+                          <a:schemeClr val="tx1"/>
+                        </a:solidFill>
+                        <a:effectLst/>
+                      </a:endParaRPr>
+                    </a:p>
+                  </a:txBody>
+                  <a:tcPr marL="95250" marR="95250" marT="95250" marB="95250" anchor="ctr">
+                    <a:lnL w="9525" cap="flat" cmpd="sng" algn="ctr">
+                      <a:solidFill>
+                        <a:srgbClr val="9E9E9E"/>
+                      </a:solidFill>
+                      <a:prstDash val="solid"/>
+                      <a:round/>
+                      <a:headEnd type="none" w="med" len="med"/>
+                      <a:tailEnd type="none" w="med" len="med"/>
+                    </a:lnL>
+                    <a:lnR w="9525" cap="flat" cmpd="sng" algn="ctr">
+                      <a:solidFill>
+                        <a:srgbClr val="9E9E9E"/>
+                      </a:solidFill>
+                      <a:prstDash val="solid"/>
+                      <a:round/>
+                      <a:headEnd type="none" w="med" len="med"/>
+                      <a:tailEnd type="none" w="med" len="med"/>
+                    </a:lnR>
+                    <a:lnT w="9525" cap="flat" cmpd="sng" algn="ctr">
+                      <a:solidFill>
+                        <a:srgbClr val="9E9E9E"/>
+                      </a:solidFill>
+                      <a:prstDash val="solid"/>
+                      <a:round/>
+                      <a:headEnd type="none" w="med" len="med"/>
+                      <a:tailEnd type="none" w="med" len="med"/>
+                    </a:lnT>
+                    <a:lnB w="9525" cap="flat" cmpd="sng" algn="ctr">
+                      <a:solidFill>
+                        <a:srgbClr val="9E9E9E"/>
+                      </a:solidFill>
+                      <a:prstDash val="solid"/>
+                      <a:round/>
+                      <a:headEnd type="none" w="med" len="med"/>
+                      <a:tailEnd type="none" w="med" len="med"/>
+                    </a:lnB>
+                    <a:noFill/>
+                  </a:tcPr>
+                </a:tc>
+                <a:extLst>
+                  <a:ext uri="{0D108BD9-81ED-4DB2-BD59-A6C34878D82A}">
+                    <a16:rowId xmlns:a16="http://schemas.microsoft.com/office/drawing/2014/main" val="2155187740"/>
+                  </a:ext>
+                </a:extLst>
+              </a:tr>
+              <a:tr h="335300">
+                <a:tc>
+                  <a:txBody>
+                    <a:bodyPr/>
+                    <a:lstStyle/>
+                    <a:p>
+                      <a:pPr rtl="0" fontAlgn="t">
+                        <a:buNone/>
+                      </a:pPr>
+                      <a:r>
+                        <a:rPr lang="en-IN" sz="600" b="0" i="0" u="none" strike="noStrike" dirty="0">
+                          <a:solidFill>
+                            <a:schemeClr val="tx1"/>
+                          </a:solidFill>
+                          <a:effectLst/>
+                          <a:latin typeface="Calibri" panose="020F0502020204030204" pitchFamily="34" charset="0"/>
+                        </a:rPr>
+                        <a:t>YoY% growth</a:t>
+                      </a:r>
+                      <a:endParaRPr lang="en-IN" dirty="0">
+                        <a:solidFill>
+                          <a:schemeClr val="tx1"/>
+                        </a:solidFill>
+                        <a:effectLst/>
+                      </a:endParaRPr>
+                    </a:p>
+                  </a:txBody>
+                  <a:tcPr marL="95250" marR="95250" marT="95250" marB="95250">
+                    <a:lnL w="9525" cap="flat" cmpd="sng" algn="ctr">
+                      <a:solidFill>
+                        <a:srgbClr val="9E9E9E"/>
+                      </a:solidFill>
+                      <a:prstDash val="solid"/>
+                      <a:round/>
+                      <a:headEnd type="none" w="med" len="med"/>
+                      <a:tailEnd type="none" w="med" len="med"/>
+                    </a:lnL>
+                    <a:lnR w="9525" cap="flat" cmpd="sng" algn="ctr">
+                      <a:solidFill>
+                        <a:srgbClr val="9E9E9E"/>
+                      </a:solidFill>
+                      <a:prstDash val="solid"/>
+                      <a:round/>
+                      <a:headEnd type="none" w="med" len="med"/>
+                      <a:tailEnd type="none" w="med" len="med"/>
+                    </a:lnR>
+                    <a:lnT w="9525" cap="flat" cmpd="sng" algn="ctr">
+                      <a:solidFill>
+                        <a:srgbClr val="9E9E9E"/>
+                      </a:solidFill>
+                      <a:prstDash val="solid"/>
+                      <a:round/>
+                      <a:headEnd type="none" w="med" len="med"/>
+                      <a:tailEnd type="none" w="med" len="med"/>
+                    </a:lnT>
+                    <a:lnB w="9525" cap="flat" cmpd="sng" algn="ctr">
+                      <a:solidFill>
+                        <a:srgbClr val="9E9E9E"/>
+                      </a:solidFill>
+                      <a:prstDash val="solid"/>
+                      <a:round/>
+                      <a:headEnd type="none" w="med" len="med"/>
+                      <a:tailEnd type="none" w="med" len="med"/>
+                    </a:lnB>
+                    <a:solidFill>
+                      <a:srgbClr val="FFE5B4"/>
+                    </a:solidFill>
+                  </a:tcPr>
+                </a:tc>
+                <a:tc>
+                  <a:txBody>
+                    <a:bodyPr/>
+                    <a:lstStyle/>
+                    <a:p>
+                      <a:pPr algn="l" fontAlgn="base">
+                        <a:buNone/>
+                      </a:pPr>
+                      <a:r>
+                        <a:rPr lang="en-IN" sz="600" b="0" dirty="0">
+                          <a:solidFill>
+                            <a:schemeClr val="tx1"/>
+                          </a:solidFill>
+                          <a:effectLst/>
+                          <a:latin typeface="Calibri" panose="020F0502020204030204" pitchFamily="34" charset="0"/>
+                          <a:ea typeface="Calibri" panose="020F0502020204030204" pitchFamily="34" charset="0"/>
+                          <a:cs typeface="Calibri" panose="020F0502020204030204" pitchFamily="34" charset="0"/>
+                        </a:rPr>
+                        <a:t>{{sales_growth_fy24}}</a:t>
+                      </a:r>
+                    </a:p>
+                  </a:txBody>
+                  <a:tcPr anchor="ctr">
+                    <a:lnL w="9525" cap="flat" cmpd="sng" algn="ctr">
+                      <a:solidFill>
+                        <a:srgbClr val="9E9E9E"/>
+                      </a:solidFill>
+                      <a:prstDash val="solid"/>
+                      <a:round/>
+                      <a:headEnd type="none" w="med" len="med"/>
+                      <a:tailEnd type="none" w="med" len="med"/>
+                    </a:lnL>
+                    <a:lnR w="9525" cap="flat" cmpd="sng" algn="ctr">
+                      <a:solidFill>
+                        <a:srgbClr val="9E9E9E"/>
+                      </a:solidFill>
+                      <a:prstDash val="solid"/>
+                      <a:round/>
+                      <a:headEnd type="none" w="med" len="med"/>
+                      <a:tailEnd type="none" w="med" len="med"/>
+                    </a:lnR>
+                    <a:lnT w="9525" cap="flat" cmpd="sng" algn="ctr">
+                      <a:solidFill>
+                        <a:srgbClr val="9E9E9E"/>
+                      </a:solidFill>
+                      <a:prstDash val="solid"/>
+                      <a:round/>
+                      <a:headEnd type="none" w="med" len="med"/>
+                      <a:tailEnd type="none" w="med" len="med"/>
+                    </a:lnT>
+                    <a:lnB w="9525" cap="flat" cmpd="sng" algn="ctr">
+                      <a:solidFill>
+                        <a:srgbClr val="9E9E9E"/>
+                      </a:solidFill>
+                      <a:prstDash val="solid"/>
+                      <a:round/>
+                      <a:headEnd type="none" w="med" len="med"/>
+                      <a:tailEnd type="none" w="med" len="med"/>
+                    </a:lnB>
+                    <a:solidFill>
+                      <a:srgbClr val="FFE5B4"/>
+                    </a:solidFill>
+                  </a:tcPr>
+                </a:tc>
+                <a:tc>
+                  <a:txBody>
+                    <a:bodyPr/>
+                    <a:lstStyle/>
+                    <a:p>
+                      <a:pPr algn="l" fontAlgn="base">
+                        <a:buNone/>
+                      </a:pPr>
+                      <a:r>
+                        <a:rPr lang="en-IN" sz="600" b="0">
+                          <a:solidFill>
+                            <a:schemeClr val="tx1"/>
+                          </a:solidFill>
+                          <a:effectLst/>
+                          <a:latin typeface="Calibri" panose="020F0502020204030204" pitchFamily="34" charset="0"/>
+                          <a:ea typeface="Calibri" panose="020F0502020204030204" pitchFamily="34" charset="0"/>
+                          <a:cs typeface="Calibri" panose="020F0502020204030204" pitchFamily="34" charset="0"/>
+                        </a:rPr>
+                        <a:t>{{sales_growth_fy25}}</a:t>
+                      </a:r>
+                    </a:p>
+                  </a:txBody>
+                  <a:tcPr anchor="ctr">
+                    <a:lnL w="9525" cap="flat" cmpd="sng" algn="ctr">
+                      <a:solidFill>
+                        <a:srgbClr val="9E9E9E"/>
+                      </a:solidFill>
+                      <a:prstDash val="solid"/>
+                      <a:round/>
+                      <a:headEnd type="none" w="med" len="med"/>
+                      <a:tailEnd type="none" w="med" len="med"/>
+                    </a:lnL>
+                    <a:lnR w="9525" cap="flat" cmpd="sng" algn="ctr">
+                      <a:solidFill>
+                        <a:srgbClr val="9E9E9E"/>
+                      </a:solidFill>
+                      <a:prstDash val="solid"/>
+                      <a:round/>
+                      <a:headEnd type="none" w="med" len="med"/>
+                      <a:tailEnd type="none" w="med" len="med"/>
+                    </a:lnR>
+                    <a:lnT w="9525" cap="flat" cmpd="sng" algn="ctr">
+                      <a:solidFill>
+                        <a:srgbClr val="9E9E9E"/>
+                      </a:solidFill>
+                      <a:prstDash val="solid"/>
+                      <a:round/>
+                      <a:headEnd type="none" w="med" len="med"/>
+                      <a:tailEnd type="none" w="med" len="med"/>
+                    </a:lnT>
+                    <a:lnB w="9525" cap="flat" cmpd="sng" algn="ctr">
+                      <a:solidFill>
+                        <a:srgbClr val="9E9E9E"/>
+                      </a:solidFill>
+                      <a:prstDash val="solid"/>
+                      <a:round/>
+                      <a:headEnd type="none" w="med" len="med"/>
+                      <a:tailEnd type="none" w="med" len="med"/>
+                    </a:lnB>
+                    <a:solidFill>
+                      <a:srgbClr val="FFE5B4"/>
+                    </a:solidFill>
+                  </a:tcPr>
+                </a:tc>
+                <a:tc>
+                  <a:txBody>
+                    <a:bodyPr/>
+                    <a:lstStyle/>
+                    <a:p>
+                      <a:pPr algn="l" fontAlgn="base">
+                        <a:buNone/>
+                      </a:pPr>
+                      <a:r>
+                        <a:rPr lang="en-IN" sz="600" b="0" dirty="0">
+                          <a:solidFill>
+                            <a:schemeClr val="tx1"/>
+                          </a:solidFill>
+                          <a:effectLst/>
+                          <a:latin typeface="Calibri" panose="020F0502020204030204" pitchFamily="34" charset="0"/>
+                          <a:ea typeface="Calibri" panose="020F0502020204030204" pitchFamily="34" charset="0"/>
+                          <a:cs typeface="Calibri" panose="020F0502020204030204" pitchFamily="34" charset="0"/>
+                        </a:rPr>
+                        <a:t>{{sales_growth_fy26}}</a:t>
+                      </a:r>
+                    </a:p>
+                  </a:txBody>
+                  <a:tcPr anchor="ctr">
+                    <a:lnL w="9525" cap="flat" cmpd="sng" algn="ctr">
+                      <a:solidFill>
+                        <a:srgbClr val="9E9E9E"/>
+                      </a:solidFill>
+                      <a:prstDash val="solid"/>
+                      <a:round/>
+                      <a:headEnd type="none" w="med" len="med"/>
+                      <a:tailEnd type="none" w="med" len="med"/>
+                    </a:lnL>
+                    <a:lnR w="9525" cap="flat" cmpd="sng" algn="ctr">
+                      <a:solidFill>
+                        <a:srgbClr val="9E9E9E"/>
+                      </a:solidFill>
+                      <a:prstDash val="solid"/>
+                      <a:round/>
+                      <a:headEnd type="none" w="med" len="med"/>
+                      <a:tailEnd type="none" w="med" len="med"/>
+                    </a:lnR>
+                    <a:lnT w="9525" cap="flat" cmpd="sng" algn="ctr">
+                      <a:solidFill>
+                        <a:srgbClr val="9E9E9E"/>
+                      </a:solidFill>
+                      <a:prstDash val="solid"/>
+                      <a:round/>
+                      <a:headEnd type="none" w="med" len="med"/>
+                      <a:tailEnd type="none" w="med" len="med"/>
+                    </a:lnT>
+                    <a:lnB w="9525" cap="flat" cmpd="sng" algn="ctr">
+                      <a:solidFill>
+                        <a:srgbClr val="9E9E9E"/>
+                      </a:solidFill>
+                      <a:prstDash val="solid"/>
+                      <a:round/>
+                      <a:headEnd type="none" w="med" len="med"/>
+                      <a:tailEnd type="none" w="med" len="med"/>
+                    </a:lnB>
+                    <a:solidFill>
+                      <a:srgbClr val="FFE5B4"/>
+                    </a:solidFill>
+                  </a:tcPr>
+                </a:tc>
+                <a:tc>
+                  <a:txBody>
+                    <a:bodyPr/>
+                    <a:lstStyle/>
+                    <a:p>
+                      <a:pPr algn="l" fontAlgn="base">
+                        <a:buNone/>
+                      </a:pPr>
+                      <a:r>
+                        <a:rPr lang="en-IN" sz="600" b="0" dirty="0">
+                          <a:solidFill>
+                            <a:schemeClr val="tx1"/>
+                          </a:solidFill>
+                          <a:effectLst/>
+                          <a:latin typeface="Calibri" panose="020F0502020204030204" pitchFamily="34" charset="0"/>
+                          <a:ea typeface="Calibri" panose="020F0502020204030204" pitchFamily="34" charset="0"/>
+                          <a:cs typeface="Calibri" panose="020F0502020204030204" pitchFamily="34" charset="0"/>
+                        </a:rPr>
+                        <a:t>{{sales_growth_fy27}}</a:t>
+                      </a:r>
+                    </a:p>
+                  </a:txBody>
+                  <a:tcPr anchor="ctr">
+                    <a:lnL w="9525" cap="flat" cmpd="sng" algn="ctr">
+                      <a:solidFill>
+                        <a:srgbClr val="9E9E9E"/>
+                      </a:solidFill>
+                      <a:prstDash val="solid"/>
+                      <a:round/>
+                      <a:headEnd type="none" w="med" len="med"/>
+                      <a:tailEnd type="none" w="med" len="med"/>
+                    </a:lnL>
+                    <a:lnR w="9525" cap="flat" cmpd="sng" algn="ctr">
+                      <a:solidFill>
+                        <a:srgbClr val="9E9E9E"/>
+                      </a:solidFill>
+                      <a:prstDash val="solid"/>
+                      <a:round/>
+                      <a:headEnd type="none" w="med" len="med"/>
+                      <a:tailEnd type="none" w="med" len="med"/>
+                    </a:lnR>
+                    <a:lnT w="9525" cap="flat" cmpd="sng" algn="ctr">
+                      <a:solidFill>
+                        <a:srgbClr val="9E9E9E"/>
+                      </a:solidFill>
+                      <a:prstDash val="solid"/>
+                      <a:round/>
+                      <a:headEnd type="none" w="med" len="med"/>
+                      <a:tailEnd type="none" w="med" len="med"/>
+                    </a:lnT>
+                    <a:lnB w="9525" cap="flat" cmpd="sng" algn="ctr">
+                      <a:solidFill>
+                        <a:srgbClr val="9E9E9E"/>
+                      </a:solidFill>
+                      <a:prstDash val="solid"/>
+                      <a:round/>
+                      <a:headEnd type="none" w="med" len="med"/>
+                      <a:tailEnd type="none" w="med" len="med"/>
+                    </a:lnB>
+                    <a:solidFill>
+                      <a:srgbClr val="FFE5B4"/>
+                    </a:solidFill>
+                  </a:tcPr>
+                </a:tc>
+                <a:tc>
+                  <a:txBody>
+                    <a:bodyPr/>
+                    <a:lstStyle/>
+                    <a:p>
+                      <a:pPr algn="l" fontAlgn="base">
+                        <a:buNone/>
+                      </a:pPr>
+                      <a:r>
+                        <a:rPr lang="en-IN" sz="600" b="0" dirty="0">
+                          <a:solidFill>
+                            <a:schemeClr val="tx1"/>
+                          </a:solidFill>
+                          <a:effectLst/>
+                          <a:latin typeface="Calibri" panose="020F0502020204030204" pitchFamily="34" charset="0"/>
+                          <a:ea typeface="Calibri" panose="020F0502020204030204" pitchFamily="34" charset="0"/>
+                          <a:cs typeface="Calibri" panose="020F0502020204030204" pitchFamily="34" charset="0"/>
+                        </a:rPr>
+                        <a:t>{{sales_growth_fy28}}</a:t>
+                      </a:r>
+                    </a:p>
+                  </a:txBody>
+                  <a:tcPr anchor="ctr">
+                    <a:lnL w="9525" cap="flat" cmpd="sng" algn="ctr">
+                      <a:solidFill>
+                        <a:srgbClr val="9E9E9E"/>
+                      </a:solidFill>
+                      <a:prstDash val="solid"/>
+                      <a:round/>
+                      <a:headEnd type="none" w="med" len="med"/>
+                      <a:tailEnd type="none" w="med" len="med"/>
+                    </a:lnL>
+                    <a:lnR w="9525" cap="flat" cmpd="sng" algn="ctr">
+                      <a:solidFill>
+                        <a:srgbClr val="9E9E9E"/>
+                      </a:solidFill>
+                      <a:prstDash val="solid"/>
+                      <a:round/>
+                      <a:headEnd type="none" w="med" len="med"/>
+                      <a:tailEnd type="none" w="med" len="med"/>
+                    </a:lnR>
+                    <a:lnT w="9525" cap="flat" cmpd="sng" algn="ctr">
+                      <a:solidFill>
+                        <a:srgbClr val="9E9E9E"/>
+                      </a:solidFill>
+                      <a:prstDash val="solid"/>
+                      <a:round/>
+                      <a:headEnd type="none" w="med" len="med"/>
+                      <a:tailEnd type="none" w="med" len="med"/>
+                    </a:lnT>
+                    <a:lnB w="9525" cap="flat" cmpd="sng" algn="ctr">
+                      <a:solidFill>
+                        <a:srgbClr val="9E9E9E"/>
+                      </a:solidFill>
+                      <a:prstDash val="solid"/>
+                      <a:round/>
+                      <a:headEnd type="none" w="med" len="med"/>
+                      <a:tailEnd type="none" w="med" len="med"/>
+                    </a:lnB>
+                    <a:solidFill>
+                      <a:srgbClr val="FFE5B4"/>
+                    </a:solidFill>
+                  </a:tcPr>
+                </a:tc>
+                <a:extLst>
+                  <a:ext uri="{0D108BD9-81ED-4DB2-BD59-A6C34878D82A}">
+                    <a16:rowId xmlns:a16="http://schemas.microsoft.com/office/drawing/2014/main" val="1902421968"/>
+                  </a:ext>
+                </a:extLst>
+              </a:tr>
+              <a:tr h="273457">
+                <a:tc>
+                  <a:txBody>
+                    <a:bodyPr/>
+                    <a:lstStyle/>
+                    <a:p>
+                      <a:pPr rtl="0" fontAlgn="t">
+                        <a:buNone/>
+                      </a:pPr>
+                      <a:r>
+                        <a:rPr lang="en-IN" sz="600" b="0" i="0" u="none" strike="noStrike">
+                          <a:solidFill>
+                            <a:schemeClr val="tx1"/>
+                          </a:solidFill>
+                          <a:effectLst/>
+                          <a:latin typeface="Calibri" panose="020F0502020204030204" pitchFamily="34" charset="0"/>
+                        </a:rPr>
+                        <a:t>EBITDA</a:t>
+                      </a:r>
+                      <a:endParaRPr lang="en-IN">
+                        <a:solidFill>
+                          <a:schemeClr val="tx1"/>
+                        </a:solidFill>
+                        <a:effectLst/>
+                      </a:endParaRPr>
+                    </a:p>
+                  </a:txBody>
+                  <a:tcPr marL="95250" marR="95250" marT="95250" marB="95250">
+                    <a:lnL w="9525" cap="flat" cmpd="sng" algn="ctr">
+                      <a:solidFill>
+                        <a:srgbClr val="9E9E9E"/>
+                      </a:solidFill>
+                      <a:prstDash val="solid"/>
+                      <a:round/>
+                      <a:headEnd type="none" w="med" len="med"/>
+                      <a:tailEnd type="none" w="med" len="med"/>
+                    </a:lnL>
+                    <a:lnR w="9525" cap="flat" cmpd="sng" algn="ctr">
+                      <a:solidFill>
+                        <a:srgbClr val="9E9E9E"/>
+                      </a:solidFill>
+                      <a:prstDash val="solid"/>
+                      <a:round/>
+                      <a:headEnd type="none" w="med" len="med"/>
+                      <a:tailEnd type="none" w="med" len="med"/>
+                    </a:lnR>
+                    <a:lnT w="9525" cap="flat" cmpd="sng" algn="ctr">
+                      <a:solidFill>
+                        <a:srgbClr val="9E9E9E"/>
+                      </a:solidFill>
+                      <a:prstDash val="solid"/>
+                      <a:round/>
+                      <a:headEnd type="none" w="med" len="med"/>
+                      <a:tailEnd type="none" w="med" len="med"/>
+                    </a:lnT>
+                    <a:lnB w="9525" cap="flat" cmpd="sng" algn="ctr">
+                      <a:solidFill>
+                        <a:srgbClr val="9E9E9E"/>
+                      </a:solidFill>
+                      <a:prstDash val="solid"/>
+                      <a:round/>
+                      <a:headEnd type="none" w="med" len="med"/>
+                      <a:tailEnd type="none" w="med" len="med"/>
+                    </a:lnB>
+                    <a:noFill/>
+                  </a:tcPr>
+                </a:tc>
+                <a:tc>
+                  <a:txBody>
+                    <a:bodyPr/>
+                    <a:lstStyle/>
+                    <a:p>
+                      <a:pPr algn="l" fontAlgn="base">
+                        <a:buNone/>
+                      </a:pPr>
+                      <a:r>
+                        <a:rPr lang="en-IN" sz="600" b="0">
+                          <a:solidFill>
+                            <a:schemeClr val="tx1"/>
+                          </a:solidFill>
+                          <a:effectLst/>
+                          <a:latin typeface="Calibri" panose="020F0502020204030204" pitchFamily="34" charset="0"/>
+                          <a:ea typeface="Calibri" panose="020F0502020204030204" pitchFamily="34" charset="0"/>
+                          <a:cs typeface="Calibri" panose="020F0502020204030204" pitchFamily="34" charset="0"/>
+                        </a:rPr>
+                        <a:t>{{ebitda_fy24}}</a:t>
+                      </a:r>
+                    </a:p>
+                  </a:txBody>
+                  <a:tcPr anchor="ctr">
+                    <a:lnL w="9525" cap="flat" cmpd="sng" algn="ctr">
+                      <a:solidFill>
+                        <a:srgbClr val="9E9E9E"/>
+                      </a:solidFill>
+                      <a:prstDash val="solid"/>
+                      <a:round/>
+                      <a:headEnd type="none" w="med" len="med"/>
+                      <a:tailEnd type="none" w="med" len="med"/>
+                    </a:lnL>
+                    <a:lnR w="9525" cap="flat" cmpd="sng" algn="ctr">
+                      <a:solidFill>
+                        <a:srgbClr val="9E9E9E"/>
+                      </a:solidFill>
+                      <a:prstDash val="solid"/>
+                      <a:round/>
+                      <a:headEnd type="none" w="med" len="med"/>
+                      <a:tailEnd type="none" w="med" len="med"/>
+                    </a:lnR>
+                    <a:lnT w="9525" cap="flat" cmpd="sng" algn="ctr">
+                      <a:solidFill>
+                        <a:srgbClr val="9E9E9E"/>
+                      </a:solidFill>
+                      <a:prstDash val="solid"/>
+                      <a:round/>
+                      <a:headEnd type="none" w="med" len="med"/>
+                      <a:tailEnd type="none" w="med" len="med"/>
+                    </a:lnT>
+                    <a:lnB w="9525" cap="flat" cmpd="sng" algn="ctr">
+                      <a:solidFill>
+                        <a:srgbClr val="9E9E9E"/>
+                      </a:solidFill>
+                      <a:prstDash val="solid"/>
+                      <a:round/>
+                      <a:headEnd type="none" w="med" len="med"/>
+                      <a:tailEnd type="none" w="med" len="med"/>
+                    </a:lnB>
+                    <a:noFill/>
+                  </a:tcPr>
+                </a:tc>
+                <a:tc>
+                  <a:txBody>
+                    <a:bodyPr/>
+                    <a:lstStyle/>
+                    <a:p>
+                      <a:pPr algn="l" fontAlgn="base">
+                        <a:buNone/>
+                      </a:pPr>
+                      <a:r>
+                        <a:rPr lang="en-IN" sz="600" b="0">
+                          <a:solidFill>
+                            <a:schemeClr val="tx1"/>
+                          </a:solidFill>
+                          <a:effectLst/>
+                          <a:latin typeface="Calibri" panose="020F0502020204030204" pitchFamily="34" charset="0"/>
+                          <a:ea typeface="Calibri" panose="020F0502020204030204" pitchFamily="34" charset="0"/>
+                          <a:cs typeface="Calibri" panose="020F0502020204030204" pitchFamily="34" charset="0"/>
+                        </a:rPr>
+                        <a:t>{{ebitda_fy25}}</a:t>
+                      </a:r>
+                    </a:p>
+                  </a:txBody>
+                  <a:tcPr anchor="ctr">
+                    <a:lnL w="9525" cap="flat" cmpd="sng" algn="ctr">
+                      <a:solidFill>
+                        <a:srgbClr val="9E9E9E"/>
+                      </a:solidFill>
+                      <a:prstDash val="solid"/>
+                      <a:round/>
+                      <a:headEnd type="none" w="med" len="med"/>
+                      <a:tailEnd type="none" w="med" len="med"/>
+                    </a:lnL>
+                    <a:lnR w="9525" cap="flat" cmpd="sng" algn="ctr">
+                      <a:solidFill>
+                        <a:srgbClr val="9E9E9E"/>
+                      </a:solidFill>
+                      <a:prstDash val="solid"/>
+                      <a:round/>
+                      <a:headEnd type="none" w="med" len="med"/>
+                      <a:tailEnd type="none" w="med" len="med"/>
+                    </a:lnR>
+                    <a:lnT w="9525" cap="flat" cmpd="sng" algn="ctr">
+                      <a:solidFill>
+                        <a:srgbClr val="9E9E9E"/>
+                      </a:solidFill>
+                      <a:prstDash val="solid"/>
+                      <a:round/>
+                      <a:headEnd type="none" w="med" len="med"/>
+                      <a:tailEnd type="none" w="med" len="med"/>
+                    </a:lnT>
+                    <a:lnB w="9525" cap="flat" cmpd="sng" algn="ctr">
+                      <a:solidFill>
+                        <a:srgbClr val="9E9E9E"/>
+                      </a:solidFill>
+                      <a:prstDash val="solid"/>
+                      <a:round/>
+                      <a:headEnd type="none" w="med" len="med"/>
+                      <a:tailEnd type="none" w="med" len="med"/>
+                    </a:lnB>
+                    <a:noFill/>
+                  </a:tcPr>
+                </a:tc>
+                <a:tc>
+                  <a:txBody>
+                    <a:bodyPr/>
+                    <a:lstStyle/>
+                    <a:p>
+                      <a:pPr algn="l" fontAlgn="base">
+                        <a:buNone/>
+                      </a:pPr>
+                      <a:r>
+                        <a:rPr lang="en-IN" sz="600" b="0">
+                          <a:solidFill>
+                            <a:schemeClr val="tx1"/>
+                          </a:solidFill>
+                          <a:effectLst/>
+                          <a:latin typeface="Calibri" panose="020F0502020204030204" pitchFamily="34" charset="0"/>
+                          <a:ea typeface="Calibri" panose="020F0502020204030204" pitchFamily="34" charset="0"/>
+                          <a:cs typeface="Calibri" panose="020F0502020204030204" pitchFamily="34" charset="0"/>
+                        </a:rPr>
+                        <a:t>{{ebitda_fy26}}</a:t>
+                      </a:r>
+                    </a:p>
+                  </a:txBody>
+                  <a:tcPr anchor="ctr">
+                    <a:lnL w="9525" cap="flat" cmpd="sng" algn="ctr">
+                      <a:solidFill>
+                        <a:srgbClr val="9E9E9E"/>
+                      </a:solidFill>
+                      <a:prstDash val="solid"/>
+                      <a:round/>
+                      <a:headEnd type="none" w="med" len="med"/>
+                      <a:tailEnd type="none" w="med" len="med"/>
+                    </a:lnL>
+                    <a:lnR w="9525" cap="flat" cmpd="sng" algn="ctr">
+                      <a:solidFill>
+                        <a:srgbClr val="9E9E9E"/>
+                      </a:solidFill>
+                      <a:prstDash val="solid"/>
+                      <a:round/>
+                      <a:headEnd type="none" w="med" len="med"/>
+                      <a:tailEnd type="none" w="med" len="med"/>
+                    </a:lnR>
+                    <a:lnT w="9525" cap="flat" cmpd="sng" algn="ctr">
+                      <a:solidFill>
+                        <a:srgbClr val="9E9E9E"/>
+                      </a:solidFill>
+                      <a:prstDash val="solid"/>
+                      <a:round/>
+                      <a:headEnd type="none" w="med" len="med"/>
+                      <a:tailEnd type="none" w="med" len="med"/>
+                    </a:lnT>
+                    <a:lnB w="9525" cap="flat" cmpd="sng" algn="ctr">
+                      <a:solidFill>
+                        <a:srgbClr val="9E9E9E"/>
+                      </a:solidFill>
+                      <a:prstDash val="solid"/>
+                      <a:round/>
+                      <a:headEnd type="none" w="med" len="med"/>
+                      <a:tailEnd type="none" w="med" len="med"/>
+                    </a:lnB>
+                    <a:noFill/>
+                  </a:tcPr>
+                </a:tc>
+                <a:tc>
+                  <a:txBody>
+                    <a:bodyPr/>
+                    <a:lstStyle/>
+                    <a:p>
+                      <a:pPr algn="l" fontAlgn="base">
+                        <a:buNone/>
+                      </a:pPr>
+                      <a:r>
+                        <a:rPr lang="en-IN" sz="600" b="0">
+                          <a:solidFill>
+                            <a:schemeClr val="tx1"/>
+                          </a:solidFill>
+                          <a:effectLst/>
+                          <a:latin typeface="Calibri" panose="020F0502020204030204" pitchFamily="34" charset="0"/>
+                          <a:ea typeface="Calibri" panose="020F0502020204030204" pitchFamily="34" charset="0"/>
+                          <a:cs typeface="Calibri" panose="020F0502020204030204" pitchFamily="34" charset="0"/>
+                        </a:rPr>
+                        <a:t>{{ebitda_fy27}}</a:t>
+                      </a:r>
+                    </a:p>
+                  </a:txBody>
+                  <a:tcPr anchor="ctr">
+                    <a:lnL w="9525" cap="flat" cmpd="sng" algn="ctr">
+                      <a:solidFill>
+                        <a:srgbClr val="9E9E9E"/>
+                      </a:solidFill>
+                      <a:prstDash val="solid"/>
+                      <a:round/>
+                      <a:headEnd type="none" w="med" len="med"/>
+                      <a:tailEnd type="none" w="med" len="med"/>
+                    </a:lnL>
+                    <a:lnR w="9525" cap="flat" cmpd="sng" algn="ctr">
+                      <a:solidFill>
+                        <a:srgbClr val="9E9E9E"/>
+                      </a:solidFill>
+                      <a:prstDash val="solid"/>
+                      <a:round/>
+                      <a:headEnd type="none" w="med" len="med"/>
+                      <a:tailEnd type="none" w="med" len="med"/>
+                    </a:lnR>
+                    <a:lnT w="9525" cap="flat" cmpd="sng" algn="ctr">
+                      <a:solidFill>
+                        <a:srgbClr val="9E9E9E"/>
+                      </a:solidFill>
+                      <a:prstDash val="solid"/>
+                      <a:round/>
+                      <a:headEnd type="none" w="med" len="med"/>
+                      <a:tailEnd type="none" w="med" len="med"/>
+                    </a:lnT>
+                    <a:lnB w="9525" cap="flat" cmpd="sng" algn="ctr">
+                      <a:solidFill>
+                        <a:srgbClr val="9E9E9E"/>
+                      </a:solidFill>
+                      <a:prstDash val="solid"/>
+                      <a:round/>
+                      <a:headEnd type="none" w="med" len="med"/>
+                      <a:tailEnd type="none" w="med" len="med"/>
+                    </a:lnB>
+                    <a:noFill/>
+                  </a:tcPr>
+                </a:tc>
+                <a:tc>
+                  <a:txBody>
+                    <a:bodyPr/>
+                    <a:lstStyle/>
+                    <a:p>
+                      <a:pPr algn="l" fontAlgn="base">
+                        <a:buNone/>
+                      </a:pPr>
+                      <a:r>
+                        <a:rPr lang="en-IN" sz="600" b="0" dirty="0">
+                          <a:solidFill>
+                            <a:schemeClr val="tx1"/>
+                          </a:solidFill>
+                          <a:effectLst/>
+                          <a:latin typeface="Calibri" panose="020F0502020204030204" pitchFamily="34" charset="0"/>
+                          <a:ea typeface="Calibri" panose="020F0502020204030204" pitchFamily="34" charset="0"/>
+                          <a:cs typeface="Calibri" panose="020F0502020204030204" pitchFamily="34" charset="0"/>
+                        </a:rPr>
+                        <a:t>{{ebitda_fy28}}</a:t>
+                      </a:r>
+                    </a:p>
+                  </a:txBody>
+                  <a:tcPr anchor="ctr">
+                    <a:lnL w="9525" cap="flat" cmpd="sng" algn="ctr">
+                      <a:solidFill>
+                        <a:srgbClr val="9E9E9E"/>
+                      </a:solidFill>
+                      <a:prstDash val="solid"/>
+                      <a:round/>
+                      <a:headEnd type="none" w="med" len="med"/>
+                      <a:tailEnd type="none" w="med" len="med"/>
+                    </a:lnL>
+                    <a:lnR w="9525" cap="flat" cmpd="sng" algn="ctr">
+                      <a:solidFill>
+                        <a:srgbClr val="9E9E9E"/>
+                      </a:solidFill>
+                      <a:prstDash val="solid"/>
+                      <a:round/>
+                      <a:headEnd type="none" w="med" len="med"/>
+                      <a:tailEnd type="none" w="med" len="med"/>
+                    </a:lnR>
+                    <a:lnT w="9525" cap="flat" cmpd="sng" algn="ctr">
+                      <a:solidFill>
+                        <a:srgbClr val="9E9E9E"/>
+                      </a:solidFill>
+                      <a:prstDash val="solid"/>
+                      <a:round/>
+                      <a:headEnd type="none" w="med" len="med"/>
+                      <a:tailEnd type="none" w="med" len="med"/>
+                    </a:lnT>
+                    <a:lnB w="9525" cap="flat" cmpd="sng" algn="ctr">
+                      <a:solidFill>
+                        <a:srgbClr val="9E9E9E"/>
+                      </a:solidFill>
+                      <a:prstDash val="solid"/>
+                      <a:round/>
+                      <a:headEnd type="none" w="med" len="med"/>
+                      <a:tailEnd type="none" w="med" len="med"/>
+                    </a:lnB>
+                    <a:noFill/>
+                  </a:tcPr>
+                </a:tc>
+                <a:extLst>
+                  <a:ext uri="{0D108BD9-81ED-4DB2-BD59-A6C34878D82A}">
+                    <a16:rowId xmlns:a16="http://schemas.microsoft.com/office/drawing/2014/main" val="954158347"/>
+                  </a:ext>
+                </a:extLst>
+              </a:tr>
+              <a:tr h="335300">
+                <a:tc>
+                  <a:txBody>
+                    <a:bodyPr/>
+                    <a:lstStyle/>
+                    <a:p>
+                      <a:pPr rtl="0" fontAlgn="t">
+                        <a:buNone/>
+                      </a:pPr>
+                      <a:r>
+                        <a:rPr lang="en-IN" sz="600" b="0" i="0" u="none" strike="noStrike" dirty="0">
+                          <a:solidFill>
+                            <a:schemeClr val="tx1"/>
+                          </a:solidFill>
+                          <a:effectLst/>
+                          <a:latin typeface="Calibri" panose="020F0502020204030204" pitchFamily="34" charset="0"/>
+                        </a:rPr>
+                        <a:t>% Margin</a:t>
+                      </a:r>
+                      <a:endParaRPr lang="en-IN" dirty="0">
+                        <a:solidFill>
+                          <a:schemeClr val="tx1"/>
+                        </a:solidFill>
+                        <a:effectLst/>
+                      </a:endParaRPr>
+                    </a:p>
+                  </a:txBody>
+                  <a:tcPr marL="95250" marR="95250" marT="95250" marB="95250">
+                    <a:lnL w="9525" cap="flat" cmpd="sng" algn="ctr">
+                      <a:solidFill>
+                        <a:srgbClr val="9E9E9E"/>
+                      </a:solidFill>
+                      <a:prstDash val="solid"/>
+                      <a:round/>
+                      <a:headEnd type="none" w="med" len="med"/>
+                      <a:tailEnd type="none" w="med" len="med"/>
+                    </a:lnL>
+                    <a:lnR w="9525" cap="flat" cmpd="sng" algn="ctr">
+                      <a:solidFill>
+                        <a:srgbClr val="9E9E9E"/>
+                      </a:solidFill>
+                      <a:prstDash val="solid"/>
+                      <a:round/>
+                      <a:headEnd type="none" w="med" len="med"/>
+                      <a:tailEnd type="none" w="med" len="med"/>
+                    </a:lnR>
+                    <a:lnT w="9525" cap="flat" cmpd="sng" algn="ctr">
+                      <a:solidFill>
+                        <a:srgbClr val="9E9E9E"/>
+                      </a:solidFill>
+                      <a:prstDash val="solid"/>
+                      <a:round/>
+                      <a:headEnd type="none" w="med" len="med"/>
+                      <a:tailEnd type="none" w="med" len="med"/>
+                    </a:lnT>
+                    <a:lnB w="9525" cap="flat" cmpd="sng" algn="ctr">
+                      <a:solidFill>
+                        <a:srgbClr val="9E9E9E"/>
+                      </a:solidFill>
+                      <a:prstDash val="solid"/>
+                      <a:round/>
+                      <a:headEnd type="none" w="med" len="med"/>
+                      <a:tailEnd type="none" w="med" len="med"/>
+                    </a:lnB>
+                    <a:solidFill>
+                      <a:srgbClr val="FFE5B4"/>
+                    </a:solidFill>
+                  </a:tcPr>
+                </a:tc>
+                <a:tc>
+                  <a:txBody>
+                    <a:bodyPr/>
+                    <a:lstStyle/>
+                    <a:p>
+                      <a:pPr algn="l" fontAlgn="base">
+                        <a:buNone/>
+                      </a:pPr>
+                      <a:r>
+                        <a:rPr lang="en-IN" sz="600" b="0" dirty="0">
+                          <a:solidFill>
+                            <a:schemeClr val="tx1"/>
+                          </a:solidFill>
+                          <a:effectLst/>
+                          <a:latin typeface="Calibri" panose="020F0502020204030204" pitchFamily="34" charset="0"/>
+                          <a:ea typeface="Calibri" panose="020F0502020204030204" pitchFamily="34" charset="0"/>
+                          <a:cs typeface="Calibri" panose="020F0502020204030204" pitchFamily="34" charset="0"/>
+                        </a:rPr>
+                        <a:t>{{ebitda_margin_fy24}}</a:t>
+                      </a:r>
+                    </a:p>
+                  </a:txBody>
+                  <a:tcPr anchor="ctr">
+                    <a:lnL w="9525" cap="flat" cmpd="sng" algn="ctr">
+                      <a:solidFill>
+                        <a:srgbClr val="9E9E9E"/>
+                      </a:solidFill>
+                      <a:prstDash val="solid"/>
+                      <a:round/>
+                      <a:headEnd type="none" w="med" len="med"/>
+                      <a:tailEnd type="none" w="med" len="med"/>
+                    </a:lnL>
+                    <a:lnR w="9525" cap="flat" cmpd="sng" algn="ctr">
+                      <a:solidFill>
+                        <a:srgbClr val="9E9E9E"/>
+                      </a:solidFill>
+                      <a:prstDash val="solid"/>
+                      <a:round/>
+                      <a:headEnd type="none" w="med" len="med"/>
+                      <a:tailEnd type="none" w="med" len="med"/>
+                    </a:lnR>
+                    <a:lnT w="9525" cap="flat" cmpd="sng" algn="ctr">
+                      <a:solidFill>
+                        <a:srgbClr val="9E9E9E"/>
+                      </a:solidFill>
+                      <a:prstDash val="solid"/>
+                      <a:round/>
+                      <a:headEnd type="none" w="med" len="med"/>
+                      <a:tailEnd type="none" w="med" len="med"/>
+                    </a:lnT>
+                    <a:lnB w="9525" cap="flat" cmpd="sng" algn="ctr">
+                      <a:solidFill>
+                        <a:srgbClr val="9E9E9E"/>
+                      </a:solidFill>
+                      <a:prstDash val="solid"/>
+                      <a:round/>
+                      <a:headEnd type="none" w="med" len="med"/>
+                      <a:tailEnd type="none" w="med" len="med"/>
+                    </a:lnB>
+                    <a:solidFill>
+                      <a:srgbClr val="FFE5B4"/>
+                    </a:solidFill>
+                  </a:tcPr>
+                </a:tc>
+                <a:tc>
+                  <a:txBody>
+                    <a:bodyPr/>
+                    <a:lstStyle/>
+                    <a:p>
+                      <a:pPr algn="l" fontAlgn="base">
+                        <a:buNone/>
+                      </a:pPr>
+                      <a:r>
+                        <a:rPr lang="en-IN" sz="600" b="0">
+                          <a:solidFill>
+                            <a:schemeClr val="tx1"/>
+                          </a:solidFill>
+                          <a:effectLst/>
+                          <a:latin typeface="Calibri" panose="020F0502020204030204" pitchFamily="34" charset="0"/>
+                          <a:ea typeface="Calibri" panose="020F0502020204030204" pitchFamily="34" charset="0"/>
+                          <a:cs typeface="Calibri" panose="020F0502020204030204" pitchFamily="34" charset="0"/>
+                        </a:rPr>
+                        <a:t>{{ebitda_margin_fy25}}</a:t>
+                      </a:r>
+                    </a:p>
+                  </a:txBody>
+                  <a:tcPr anchor="ctr">
+                    <a:lnL w="9525" cap="flat" cmpd="sng" algn="ctr">
+                      <a:solidFill>
+                        <a:srgbClr val="9E9E9E"/>
+                      </a:solidFill>
+                      <a:prstDash val="solid"/>
+                      <a:round/>
+                      <a:headEnd type="none" w="med" len="med"/>
+                      <a:tailEnd type="none" w="med" len="med"/>
+                    </a:lnL>
+                    <a:lnR w="9525" cap="flat" cmpd="sng" algn="ctr">
+                      <a:solidFill>
+                        <a:srgbClr val="9E9E9E"/>
+                      </a:solidFill>
+                      <a:prstDash val="solid"/>
+                      <a:round/>
+                      <a:headEnd type="none" w="med" len="med"/>
+                      <a:tailEnd type="none" w="med" len="med"/>
+                    </a:lnR>
+                    <a:lnT w="9525" cap="flat" cmpd="sng" algn="ctr">
+                      <a:solidFill>
+                        <a:srgbClr val="9E9E9E"/>
+                      </a:solidFill>
+                      <a:prstDash val="solid"/>
+                      <a:round/>
+                      <a:headEnd type="none" w="med" len="med"/>
+                      <a:tailEnd type="none" w="med" len="med"/>
+                    </a:lnT>
+                    <a:lnB w="9525" cap="flat" cmpd="sng" algn="ctr">
+                      <a:solidFill>
+                        <a:srgbClr val="9E9E9E"/>
+                      </a:solidFill>
+                      <a:prstDash val="solid"/>
+                      <a:round/>
+                      <a:headEnd type="none" w="med" len="med"/>
+                      <a:tailEnd type="none" w="med" len="med"/>
+                    </a:lnB>
+                    <a:solidFill>
+                      <a:srgbClr val="FFE5B4"/>
+                    </a:solidFill>
+                  </a:tcPr>
+                </a:tc>
+                <a:tc>
+                  <a:txBody>
+                    <a:bodyPr/>
+                    <a:lstStyle/>
+                    <a:p>
+                      <a:pPr algn="l" fontAlgn="base">
+                        <a:buNone/>
+                      </a:pPr>
+                      <a:r>
+                        <a:rPr lang="en-IN" sz="600" b="0" dirty="0">
+                          <a:solidFill>
+                            <a:schemeClr val="tx1"/>
+                          </a:solidFill>
+                          <a:effectLst/>
+                          <a:latin typeface="Calibri" panose="020F0502020204030204" pitchFamily="34" charset="0"/>
+                          <a:ea typeface="Calibri" panose="020F0502020204030204" pitchFamily="34" charset="0"/>
+                          <a:cs typeface="Calibri" panose="020F0502020204030204" pitchFamily="34" charset="0"/>
+                        </a:rPr>
+                        <a:t>{{ebitda_margin_fy26}}</a:t>
+                      </a:r>
+                    </a:p>
+                  </a:txBody>
+                  <a:tcPr anchor="ctr">
+                    <a:lnL w="9525" cap="flat" cmpd="sng" algn="ctr">
+                      <a:solidFill>
+                        <a:srgbClr val="9E9E9E"/>
+                      </a:solidFill>
+                      <a:prstDash val="solid"/>
+                      <a:round/>
+                      <a:headEnd type="none" w="med" len="med"/>
+                      <a:tailEnd type="none" w="med" len="med"/>
+                    </a:lnL>
+                    <a:lnR w="9525" cap="flat" cmpd="sng" algn="ctr">
+                      <a:solidFill>
+                        <a:srgbClr val="9E9E9E"/>
+                      </a:solidFill>
+                      <a:prstDash val="solid"/>
+                      <a:round/>
+                      <a:headEnd type="none" w="med" len="med"/>
+                      <a:tailEnd type="none" w="med" len="med"/>
+                    </a:lnR>
+                    <a:lnT w="9525" cap="flat" cmpd="sng" algn="ctr">
+                      <a:solidFill>
+                        <a:srgbClr val="9E9E9E"/>
+                      </a:solidFill>
+                      <a:prstDash val="solid"/>
+                      <a:round/>
+                      <a:headEnd type="none" w="med" len="med"/>
+                      <a:tailEnd type="none" w="med" len="med"/>
+                    </a:lnT>
+                    <a:lnB w="9525" cap="flat" cmpd="sng" algn="ctr">
+                      <a:solidFill>
+                        <a:srgbClr val="9E9E9E"/>
+                      </a:solidFill>
+                      <a:prstDash val="solid"/>
+                      <a:round/>
+                      <a:headEnd type="none" w="med" len="med"/>
+                      <a:tailEnd type="none" w="med" len="med"/>
+                    </a:lnB>
+                    <a:solidFill>
+                      <a:srgbClr val="FFE5B4"/>
+                    </a:solidFill>
+                  </a:tcPr>
+                </a:tc>
+                <a:tc>
+                  <a:txBody>
+                    <a:bodyPr/>
+                    <a:lstStyle/>
+                    <a:p>
+                      <a:pPr algn="l" fontAlgn="base">
+                        <a:buNone/>
+                      </a:pPr>
+                      <a:r>
+                        <a:rPr lang="en-IN" sz="600" b="0">
+                          <a:solidFill>
+                            <a:schemeClr val="tx1"/>
+                          </a:solidFill>
+                          <a:effectLst/>
+                          <a:latin typeface="Calibri" panose="020F0502020204030204" pitchFamily="34" charset="0"/>
+                          <a:ea typeface="Calibri" panose="020F0502020204030204" pitchFamily="34" charset="0"/>
+                          <a:cs typeface="Calibri" panose="020F0502020204030204" pitchFamily="34" charset="0"/>
+                        </a:rPr>
+                        <a:t>{{ebitda_margin_fy27}}</a:t>
+                      </a:r>
+                    </a:p>
+                  </a:txBody>
+                  <a:tcPr anchor="ctr">
+                    <a:lnL w="9525" cap="flat" cmpd="sng" algn="ctr">
+                      <a:solidFill>
+                        <a:srgbClr val="9E9E9E"/>
+                      </a:solidFill>
+                      <a:prstDash val="solid"/>
+                      <a:round/>
+                      <a:headEnd type="none" w="med" len="med"/>
+                      <a:tailEnd type="none" w="med" len="med"/>
+                    </a:lnL>
+                    <a:lnR w="9525" cap="flat" cmpd="sng" algn="ctr">
+                      <a:solidFill>
+                        <a:srgbClr val="9E9E9E"/>
+                      </a:solidFill>
+                      <a:prstDash val="solid"/>
+                      <a:round/>
+                      <a:headEnd type="none" w="med" len="med"/>
+                      <a:tailEnd type="none" w="med" len="med"/>
+                    </a:lnR>
+                    <a:lnT w="9525" cap="flat" cmpd="sng" algn="ctr">
+                      <a:solidFill>
+                        <a:srgbClr val="9E9E9E"/>
+                      </a:solidFill>
+                      <a:prstDash val="solid"/>
+                      <a:round/>
+                      <a:headEnd type="none" w="med" len="med"/>
+                      <a:tailEnd type="none" w="med" len="med"/>
+                    </a:lnT>
+                    <a:lnB w="9525" cap="flat" cmpd="sng" algn="ctr">
+                      <a:solidFill>
+                        <a:srgbClr val="9E9E9E"/>
+                      </a:solidFill>
+                      <a:prstDash val="solid"/>
+                      <a:round/>
+                      <a:headEnd type="none" w="med" len="med"/>
+                      <a:tailEnd type="none" w="med" len="med"/>
+                    </a:lnB>
+                    <a:solidFill>
+                      <a:srgbClr val="FFE5B4"/>
+                    </a:solidFill>
+                  </a:tcPr>
+                </a:tc>
+                <a:tc>
+                  <a:txBody>
+                    <a:bodyPr/>
+                    <a:lstStyle/>
+                    <a:p>
+                      <a:pPr algn="l" fontAlgn="base">
+                        <a:buNone/>
+                      </a:pPr>
+                      <a:r>
+                        <a:rPr lang="en-IN" sz="600" b="0" dirty="0">
+                          <a:solidFill>
+                            <a:schemeClr val="tx1"/>
+                          </a:solidFill>
+                          <a:effectLst/>
+                          <a:latin typeface="Calibri" panose="020F0502020204030204" pitchFamily="34" charset="0"/>
+                          <a:ea typeface="Calibri" panose="020F0502020204030204" pitchFamily="34" charset="0"/>
+                          <a:cs typeface="Calibri" panose="020F0502020204030204" pitchFamily="34" charset="0"/>
+                        </a:rPr>
+                        <a:t>{{ebitda_margin_fy28}}</a:t>
+                      </a:r>
+                    </a:p>
+                  </a:txBody>
+                  <a:tcPr anchor="ctr">
+                    <a:lnL w="9525" cap="flat" cmpd="sng" algn="ctr">
+                      <a:solidFill>
+                        <a:srgbClr val="9E9E9E"/>
+                      </a:solidFill>
+                      <a:prstDash val="solid"/>
+                      <a:round/>
+                      <a:headEnd type="none" w="med" len="med"/>
+                      <a:tailEnd type="none" w="med" len="med"/>
+                    </a:lnL>
+                    <a:lnR w="9525" cap="flat" cmpd="sng" algn="ctr">
+                      <a:solidFill>
+                        <a:srgbClr val="9E9E9E"/>
+                      </a:solidFill>
+                      <a:prstDash val="solid"/>
+                      <a:round/>
+                      <a:headEnd type="none" w="med" len="med"/>
+                      <a:tailEnd type="none" w="med" len="med"/>
+                    </a:lnR>
+                    <a:lnT w="9525" cap="flat" cmpd="sng" algn="ctr">
+                      <a:solidFill>
+                        <a:srgbClr val="9E9E9E"/>
+                      </a:solidFill>
+                      <a:prstDash val="solid"/>
+                      <a:round/>
+                      <a:headEnd type="none" w="med" len="med"/>
+                      <a:tailEnd type="none" w="med" len="med"/>
+                    </a:lnT>
+                    <a:lnB w="9525" cap="flat" cmpd="sng" algn="ctr">
+                      <a:solidFill>
+                        <a:srgbClr val="9E9E9E"/>
+                      </a:solidFill>
+                      <a:prstDash val="solid"/>
+                      <a:round/>
+                      <a:headEnd type="none" w="med" len="med"/>
+                      <a:tailEnd type="none" w="med" len="med"/>
+                    </a:lnB>
+                    <a:solidFill>
+                      <a:srgbClr val="FFE5B4"/>
+                    </a:solidFill>
+                  </a:tcPr>
+                </a:tc>
+                <a:extLst>
+                  <a:ext uri="{0D108BD9-81ED-4DB2-BD59-A6C34878D82A}">
+                    <a16:rowId xmlns:a16="http://schemas.microsoft.com/office/drawing/2014/main" val="3717934197"/>
+                  </a:ext>
+                </a:extLst>
+              </a:tr>
+              <a:tr h="335300">
+                <a:tc>
+                  <a:txBody>
+                    <a:bodyPr/>
+                    <a:lstStyle/>
+                    <a:p>
+                      <a:pPr rtl="0" fontAlgn="t">
+                        <a:buNone/>
+                      </a:pPr>
+                      <a:r>
+                        <a:rPr lang="en-IN" sz="600" b="0" i="0" u="none" strike="noStrike" dirty="0">
+                          <a:solidFill>
+                            <a:schemeClr val="tx1"/>
+                          </a:solidFill>
+                          <a:effectLst/>
+                          <a:latin typeface="Calibri" panose="020F0502020204030204" pitchFamily="34" charset="0"/>
+                        </a:rPr>
+                        <a:t>YoY% growth</a:t>
+                      </a:r>
+                      <a:endParaRPr lang="en-IN" dirty="0">
+                        <a:solidFill>
+                          <a:schemeClr val="tx1"/>
+                        </a:solidFill>
+                        <a:effectLst/>
+                      </a:endParaRPr>
+                    </a:p>
+                  </a:txBody>
+                  <a:tcPr marL="95250" marR="95250" marT="95250" marB="95250">
+                    <a:lnL w="9525" cap="flat" cmpd="sng" algn="ctr">
+                      <a:solidFill>
+                        <a:srgbClr val="9E9E9E"/>
+                      </a:solidFill>
+                      <a:prstDash val="solid"/>
+                      <a:round/>
+                      <a:headEnd type="none" w="med" len="med"/>
+                      <a:tailEnd type="none" w="med" len="med"/>
+                    </a:lnL>
+                    <a:lnR w="9525" cap="flat" cmpd="sng" algn="ctr">
+                      <a:solidFill>
+                        <a:srgbClr val="9E9E9E"/>
+                      </a:solidFill>
+                      <a:prstDash val="solid"/>
+                      <a:round/>
+                      <a:headEnd type="none" w="med" len="med"/>
+                      <a:tailEnd type="none" w="med" len="med"/>
+                    </a:lnR>
+                    <a:lnT w="9525" cap="flat" cmpd="sng" algn="ctr">
+                      <a:solidFill>
+                        <a:srgbClr val="9E9E9E"/>
+                      </a:solidFill>
+                      <a:prstDash val="solid"/>
+                      <a:round/>
+                      <a:headEnd type="none" w="med" len="med"/>
+                      <a:tailEnd type="none" w="med" len="med"/>
+                    </a:lnT>
+                    <a:lnB w="9525" cap="flat" cmpd="sng" algn="ctr">
+                      <a:solidFill>
+                        <a:srgbClr val="9E9E9E"/>
+                      </a:solidFill>
+                      <a:prstDash val="solid"/>
+                      <a:round/>
+                      <a:headEnd type="none" w="med" len="med"/>
+                      <a:tailEnd type="none" w="med" len="med"/>
+                    </a:lnB>
+                    <a:noFill/>
+                  </a:tcPr>
+                </a:tc>
+                <a:tc>
+                  <a:txBody>
+                    <a:bodyPr/>
+                    <a:lstStyle/>
+                    <a:p>
+                      <a:pPr algn="l" fontAlgn="base">
+                        <a:buNone/>
+                      </a:pPr>
+                      <a:r>
+                        <a:rPr lang="en-IN" sz="600" b="0">
+                          <a:solidFill>
+                            <a:schemeClr val="tx1"/>
+                          </a:solidFill>
+                          <a:effectLst/>
+                          <a:latin typeface="SF Mono"/>
+                        </a:rPr>
+                        <a:t>{{ebitda_growth_fy24}}</a:t>
+                      </a:r>
+                    </a:p>
+                  </a:txBody>
+                  <a:tcPr anchor="ctr">
+                    <a:lnL w="9525" cap="flat" cmpd="sng" algn="ctr">
+                      <a:solidFill>
+                        <a:srgbClr val="9E9E9E"/>
+                      </a:solidFill>
+                      <a:prstDash val="solid"/>
+                      <a:round/>
+                      <a:headEnd type="none" w="med" len="med"/>
+                      <a:tailEnd type="none" w="med" len="med"/>
+                    </a:lnL>
+                    <a:lnR w="9525" cap="flat" cmpd="sng" algn="ctr">
+                      <a:solidFill>
+                        <a:srgbClr val="9E9E9E"/>
+                      </a:solidFill>
+                      <a:prstDash val="solid"/>
+                      <a:round/>
+                      <a:headEnd type="none" w="med" len="med"/>
+                      <a:tailEnd type="none" w="med" len="med"/>
+                    </a:lnR>
+                    <a:lnT w="9525" cap="flat" cmpd="sng" algn="ctr">
+                      <a:solidFill>
+                        <a:srgbClr val="9E9E9E"/>
+                      </a:solidFill>
+                      <a:prstDash val="solid"/>
+                      <a:round/>
+                      <a:headEnd type="none" w="med" len="med"/>
+                      <a:tailEnd type="none" w="med" len="med"/>
+                    </a:lnT>
+                    <a:lnB w="9525" cap="flat" cmpd="sng" algn="ctr">
+                      <a:solidFill>
+                        <a:srgbClr val="9E9E9E"/>
+                      </a:solidFill>
+                      <a:prstDash val="solid"/>
+                      <a:round/>
+                      <a:headEnd type="none" w="med" len="med"/>
+                      <a:tailEnd type="none" w="med" len="med"/>
+                    </a:lnB>
+                    <a:noFill/>
+                  </a:tcPr>
+                </a:tc>
+                <a:tc>
+                  <a:txBody>
+                    <a:bodyPr/>
+                    <a:lstStyle/>
+                    <a:p>
+                      <a:pPr algn="l" fontAlgn="base">
+                        <a:buNone/>
+                      </a:pPr>
+                      <a:r>
+                        <a:rPr lang="en-IN" sz="600" b="0">
+                          <a:solidFill>
+                            <a:schemeClr val="tx1"/>
+                          </a:solidFill>
+                          <a:effectLst/>
+                          <a:latin typeface="SF Mono"/>
+                        </a:rPr>
+                        <a:t>{{ebitda_growth_fy25}}</a:t>
+                      </a:r>
+                    </a:p>
+                  </a:txBody>
+                  <a:tcPr anchor="ctr">
+                    <a:lnL w="9525" cap="flat" cmpd="sng" algn="ctr">
+                      <a:solidFill>
+                        <a:srgbClr val="9E9E9E"/>
+                      </a:solidFill>
+                      <a:prstDash val="solid"/>
+                      <a:round/>
+                      <a:headEnd type="none" w="med" len="med"/>
+                      <a:tailEnd type="none" w="med" len="med"/>
+                    </a:lnL>
+                    <a:lnR w="9525" cap="flat" cmpd="sng" algn="ctr">
+                      <a:solidFill>
+                        <a:srgbClr val="9E9E9E"/>
+                      </a:solidFill>
+                      <a:prstDash val="solid"/>
+                      <a:round/>
+                      <a:headEnd type="none" w="med" len="med"/>
+                      <a:tailEnd type="none" w="med" len="med"/>
+                    </a:lnR>
+                    <a:lnT w="9525" cap="flat" cmpd="sng" algn="ctr">
+                      <a:solidFill>
+                        <a:srgbClr val="9E9E9E"/>
+                      </a:solidFill>
+                      <a:prstDash val="solid"/>
+                      <a:round/>
+                      <a:headEnd type="none" w="med" len="med"/>
+                      <a:tailEnd type="none" w="med" len="med"/>
+                    </a:lnT>
+                    <a:lnB w="9525" cap="flat" cmpd="sng" algn="ctr">
+                      <a:solidFill>
+                        <a:srgbClr val="9E9E9E"/>
+                      </a:solidFill>
+                      <a:prstDash val="solid"/>
+                      <a:round/>
+                      <a:headEnd type="none" w="med" len="med"/>
+                      <a:tailEnd type="none" w="med" len="med"/>
+                    </a:lnB>
+                    <a:noFill/>
+                  </a:tcPr>
+                </a:tc>
+                <a:tc>
+                  <a:txBody>
+                    <a:bodyPr/>
+                    <a:lstStyle/>
+                    <a:p>
+                      <a:pPr algn="l" fontAlgn="base">
+                        <a:buNone/>
+                      </a:pPr>
+                      <a:r>
+                        <a:rPr lang="en-IN" sz="600" b="0">
+                          <a:solidFill>
+                            <a:schemeClr val="tx1"/>
+                          </a:solidFill>
+                          <a:effectLst/>
+                          <a:latin typeface="SF Mono"/>
+                        </a:rPr>
+                        <a:t>{{ebitda_growth_fy26}}</a:t>
+                      </a:r>
+                    </a:p>
+                  </a:txBody>
+                  <a:tcPr anchor="ctr">
+                    <a:lnL w="9525" cap="flat" cmpd="sng" algn="ctr">
+                      <a:solidFill>
+                        <a:srgbClr val="9E9E9E"/>
+                      </a:solidFill>
+                      <a:prstDash val="solid"/>
+                      <a:round/>
+                      <a:headEnd type="none" w="med" len="med"/>
+                      <a:tailEnd type="none" w="med" len="med"/>
+                    </a:lnL>
+                    <a:lnR w="9525" cap="flat" cmpd="sng" algn="ctr">
+                      <a:solidFill>
+                        <a:srgbClr val="9E9E9E"/>
+                      </a:solidFill>
+                      <a:prstDash val="solid"/>
+                      <a:round/>
+                      <a:headEnd type="none" w="med" len="med"/>
+                      <a:tailEnd type="none" w="med" len="med"/>
+                    </a:lnR>
+                    <a:lnT w="9525" cap="flat" cmpd="sng" algn="ctr">
+                      <a:solidFill>
+                        <a:srgbClr val="9E9E9E"/>
+                      </a:solidFill>
+                      <a:prstDash val="solid"/>
+                      <a:round/>
+                      <a:headEnd type="none" w="med" len="med"/>
+                      <a:tailEnd type="none" w="med" len="med"/>
+                    </a:lnT>
+                    <a:lnB w="9525" cap="flat" cmpd="sng" algn="ctr">
+                      <a:solidFill>
+                        <a:srgbClr val="9E9E9E"/>
+                      </a:solidFill>
+                      <a:prstDash val="solid"/>
+                      <a:round/>
+                      <a:headEnd type="none" w="med" len="med"/>
+                      <a:tailEnd type="none" w="med" len="med"/>
+                    </a:lnB>
+                    <a:noFill/>
+                  </a:tcPr>
+                </a:tc>
+                <a:tc>
+                  <a:txBody>
+                    <a:bodyPr/>
+                    <a:lstStyle/>
+                    <a:p>
+                      <a:pPr algn="l" fontAlgn="base">
+                        <a:buNone/>
+                      </a:pPr>
+                      <a:r>
+                        <a:rPr lang="en-IN" sz="600" b="0">
+                          <a:solidFill>
+                            <a:schemeClr val="tx1"/>
+                          </a:solidFill>
+                          <a:effectLst/>
+                          <a:latin typeface="SF Mono"/>
+                        </a:rPr>
+                        <a:t>{{ebitda_growth_fy27}}</a:t>
+                      </a:r>
+                    </a:p>
+                  </a:txBody>
+                  <a:tcPr anchor="ctr">
+                    <a:lnL w="9525" cap="flat" cmpd="sng" algn="ctr">
+                      <a:solidFill>
+                        <a:srgbClr val="9E9E9E"/>
+                      </a:solidFill>
+                      <a:prstDash val="solid"/>
+                      <a:round/>
+                      <a:headEnd type="none" w="med" len="med"/>
+                      <a:tailEnd type="none" w="med" len="med"/>
+                    </a:lnL>
+                    <a:lnR w="9525" cap="flat" cmpd="sng" algn="ctr">
+                      <a:solidFill>
+                        <a:srgbClr val="9E9E9E"/>
+                      </a:solidFill>
+                      <a:prstDash val="solid"/>
+                      <a:round/>
+                      <a:headEnd type="none" w="med" len="med"/>
+                      <a:tailEnd type="none" w="med" len="med"/>
+                    </a:lnR>
+                    <a:lnT w="9525" cap="flat" cmpd="sng" algn="ctr">
+                      <a:solidFill>
+                        <a:srgbClr val="9E9E9E"/>
+                      </a:solidFill>
+                      <a:prstDash val="solid"/>
+                      <a:round/>
+                      <a:headEnd type="none" w="med" len="med"/>
+                      <a:tailEnd type="none" w="med" len="med"/>
+                    </a:lnT>
+                    <a:lnB w="9525" cap="flat" cmpd="sng" algn="ctr">
+                      <a:solidFill>
+                        <a:srgbClr val="9E9E9E"/>
+                      </a:solidFill>
+                      <a:prstDash val="solid"/>
+                      <a:round/>
+                      <a:headEnd type="none" w="med" len="med"/>
+                      <a:tailEnd type="none" w="med" len="med"/>
+                    </a:lnB>
+                    <a:noFill/>
+                  </a:tcPr>
+                </a:tc>
+                <a:tc>
+                  <a:txBody>
+                    <a:bodyPr/>
+                    <a:lstStyle/>
+                    <a:p>
+                      <a:pPr algn="l" fontAlgn="base">
+                        <a:buNone/>
+                      </a:pPr>
+                      <a:r>
+                        <a:rPr lang="en-IN" sz="600" b="0" dirty="0">
+                          <a:solidFill>
+                            <a:schemeClr val="tx1"/>
+                          </a:solidFill>
+                          <a:effectLst/>
+                          <a:latin typeface="SF Mono"/>
+                        </a:rPr>
+                        <a:t>{{ebitda_growth_fy28}}</a:t>
+                      </a:r>
+                    </a:p>
+                  </a:txBody>
+                  <a:tcPr anchor="ctr">
+                    <a:lnL w="9525" cap="flat" cmpd="sng" algn="ctr">
+                      <a:solidFill>
+                        <a:srgbClr val="9E9E9E"/>
+                      </a:solidFill>
+                      <a:prstDash val="solid"/>
+                      <a:round/>
+                      <a:headEnd type="none" w="med" len="med"/>
+                      <a:tailEnd type="none" w="med" len="med"/>
+                    </a:lnL>
+                    <a:lnR w="9525" cap="flat" cmpd="sng" algn="ctr">
+                      <a:solidFill>
+                        <a:srgbClr val="9E9E9E"/>
+                      </a:solidFill>
+                      <a:prstDash val="solid"/>
+                      <a:round/>
+                      <a:headEnd type="none" w="med" len="med"/>
+                      <a:tailEnd type="none" w="med" len="med"/>
+                    </a:lnR>
+                    <a:lnT w="9525" cap="flat" cmpd="sng" algn="ctr">
+                      <a:solidFill>
+                        <a:srgbClr val="9E9E9E"/>
+                      </a:solidFill>
+                      <a:prstDash val="solid"/>
+                      <a:round/>
+                      <a:headEnd type="none" w="med" len="med"/>
+                      <a:tailEnd type="none" w="med" len="med"/>
+                    </a:lnT>
+                    <a:lnB w="9525" cap="flat" cmpd="sng" algn="ctr">
+                      <a:solidFill>
+                        <a:srgbClr val="9E9E9E"/>
+                      </a:solidFill>
+                      <a:prstDash val="solid"/>
+                      <a:round/>
+                      <a:headEnd type="none" w="med" len="med"/>
+                      <a:tailEnd type="none" w="med" len="med"/>
+                    </a:lnB>
+                    <a:noFill/>
+                  </a:tcPr>
+                </a:tc>
+                <a:extLst>
+                  <a:ext uri="{0D108BD9-81ED-4DB2-BD59-A6C34878D82A}">
+                    <a16:rowId xmlns:a16="http://schemas.microsoft.com/office/drawing/2014/main" val="1749798590"/>
+                  </a:ext>
+                </a:extLst>
+              </a:tr>
+              <a:tr h="273457">
+                <a:tc>
+                  <a:txBody>
+                    <a:bodyPr/>
+                    <a:lstStyle/>
+                    <a:p>
+                      <a:pPr rtl="0" fontAlgn="t">
+                        <a:buNone/>
+                      </a:pPr>
+                      <a:r>
+                        <a:rPr lang="en-IN" sz="600" b="0" i="0" u="none" strike="noStrike">
+                          <a:solidFill>
+                            <a:schemeClr val="tx1"/>
+                          </a:solidFill>
+                          <a:effectLst/>
+                          <a:latin typeface="Calibri" panose="020F0502020204030204" pitchFamily="34" charset="0"/>
+                        </a:rPr>
+                        <a:t>PAT</a:t>
+                      </a:r>
+                      <a:endParaRPr lang="en-IN">
+                        <a:solidFill>
+                          <a:schemeClr val="tx1"/>
+                        </a:solidFill>
+                        <a:effectLst/>
+                      </a:endParaRPr>
+                    </a:p>
+                  </a:txBody>
+                  <a:tcPr marL="95250" marR="95250" marT="95250" marB="95250">
+                    <a:lnL w="9525" cap="flat" cmpd="sng" algn="ctr">
+                      <a:solidFill>
+                        <a:srgbClr val="9E9E9E"/>
+                      </a:solidFill>
+                      <a:prstDash val="solid"/>
+                      <a:round/>
+                      <a:headEnd type="none" w="med" len="med"/>
+                      <a:tailEnd type="none" w="med" len="med"/>
+                    </a:lnL>
+                    <a:lnR w="9525" cap="flat" cmpd="sng" algn="ctr">
+                      <a:solidFill>
+                        <a:srgbClr val="9E9E9E"/>
+                      </a:solidFill>
+                      <a:prstDash val="solid"/>
+                      <a:round/>
+                      <a:headEnd type="none" w="med" len="med"/>
+                      <a:tailEnd type="none" w="med" len="med"/>
+                    </a:lnR>
+                    <a:lnT w="9525" cap="flat" cmpd="sng" algn="ctr">
+                      <a:solidFill>
+                        <a:srgbClr val="9E9E9E"/>
+                      </a:solidFill>
+                      <a:prstDash val="solid"/>
+                      <a:round/>
+                      <a:headEnd type="none" w="med" len="med"/>
+                      <a:tailEnd type="none" w="med" len="med"/>
+                    </a:lnT>
+                    <a:lnB w="9525" cap="flat" cmpd="sng" algn="ctr">
+                      <a:solidFill>
+                        <a:srgbClr val="9E9E9E"/>
+                      </a:solidFill>
+                      <a:prstDash val="solid"/>
+                      <a:round/>
+                      <a:headEnd type="none" w="med" len="med"/>
+                      <a:tailEnd type="none" w="med" len="med"/>
+                    </a:lnB>
+                    <a:solidFill>
+                      <a:srgbClr val="FFE5B4"/>
+                    </a:solidFill>
+                  </a:tcPr>
+                </a:tc>
+                <a:tc>
+                  <a:txBody>
+                    <a:bodyPr/>
+                    <a:lstStyle/>
+                    <a:p>
+                      <a:pPr algn="l" fontAlgn="base">
+                        <a:buNone/>
+                      </a:pPr>
+                      <a:r>
+                        <a:rPr lang="en-IN" sz="600" b="0" dirty="0">
+                          <a:solidFill>
+                            <a:schemeClr val="tx1"/>
+                          </a:solidFill>
+                          <a:effectLst/>
+                          <a:latin typeface="Calibri" panose="020F0502020204030204" pitchFamily="34" charset="0"/>
+                          <a:ea typeface="Calibri" panose="020F0502020204030204" pitchFamily="34" charset="0"/>
+                          <a:cs typeface="Calibri" panose="020F0502020204030204" pitchFamily="34" charset="0"/>
+                        </a:rPr>
+                        <a:t>{{pat_fy24}}</a:t>
+                      </a:r>
+                    </a:p>
+                  </a:txBody>
+                  <a:tcPr anchor="ctr">
+                    <a:lnL w="9525" cap="flat" cmpd="sng" algn="ctr">
+                      <a:solidFill>
+                        <a:srgbClr val="9E9E9E"/>
+                      </a:solidFill>
+                      <a:prstDash val="solid"/>
+                      <a:round/>
+                      <a:headEnd type="none" w="med" len="med"/>
+                      <a:tailEnd type="none" w="med" len="med"/>
+                    </a:lnL>
+                    <a:lnR w="9525" cap="flat" cmpd="sng" algn="ctr">
+                      <a:solidFill>
+                        <a:srgbClr val="9E9E9E"/>
+                      </a:solidFill>
+                      <a:prstDash val="solid"/>
+                      <a:round/>
+                      <a:headEnd type="none" w="med" len="med"/>
+                      <a:tailEnd type="none" w="med" len="med"/>
+                    </a:lnR>
+                    <a:lnT w="9525" cap="flat" cmpd="sng" algn="ctr">
+                      <a:solidFill>
+                        <a:srgbClr val="9E9E9E"/>
+                      </a:solidFill>
+                      <a:prstDash val="solid"/>
+                      <a:round/>
+                      <a:headEnd type="none" w="med" len="med"/>
+                      <a:tailEnd type="none" w="med" len="med"/>
+                    </a:lnT>
+                    <a:lnB w="9525" cap="flat" cmpd="sng" algn="ctr">
+                      <a:solidFill>
+                        <a:srgbClr val="9E9E9E"/>
+                      </a:solidFill>
+                      <a:prstDash val="solid"/>
+                      <a:round/>
+                      <a:headEnd type="none" w="med" len="med"/>
+                      <a:tailEnd type="none" w="med" len="med"/>
+                    </a:lnB>
+                    <a:solidFill>
+                      <a:srgbClr val="FFE5B4"/>
+                    </a:solidFill>
+                  </a:tcPr>
+                </a:tc>
+                <a:tc>
+                  <a:txBody>
+                    <a:bodyPr/>
+                    <a:lstStyle/>
+                    <a:p>
+                      <a:pPr algn="l" fontAlgn="base">
+                        <a:buNone/>
+                      </a:pPr>
+                      <a:r>
+                        <a:rPr lang="en-IN" sz="600" b="0">
+                          <a:solidFill>
+                            <a:schemeClr val="tx1"/>
+                          </a:solidFill>
+                          <a:effectLst/>
+                          <a:latin typeface="Calibri" panose="020F0502020204030204" pitchFamily="34" charset="0"/>
+                          <a:ea typeface="Calibri" panose="020F0502020204030204" pitchFamily="34" charset="0"/>
+                          <a:cs typeface="Calibri" panose="020F0502020204030204" pitchFamily="34" charset="0"/>
+                        </a:rPr>
+                        <a:t>{{pat_fy25}}</a:t>
+                      </a:r>
+                    </a:p>
+                  </a:txBody>
+                  <a:tcPr anchor="ctr">
+                    <a:lnL w="9525" cap="flat" cmpd="sng" algn="ctr">
+                      <a:solidFill>
+                        <a:srgbClr val="9E9E9E"/>
+                      </a:solidFill>
+                      <a:prstDash val="solid"/>
+                      <a:round/>
+                      <a:headEnd type="none" w="med" len="med"/>
+                      <a:tailEnd type="none" w="med" len="med"/>
+                    </a:lnL>
+                    <a:lnR w="9525" cap="flat" cmpd="sng" algn="ctr">
+                      <a:solidFill>
+                        <a:srgbClr val="9E9E9E"/>
+                      </a:solidFill>
+                      <a:prstDash val="solid"/>
+                      <a:round/>
+                      <a:headEnd type="none" w="med" len="med"/>
+                      <a:tailEnd type="none" w="med" len="med"/>
+                    </a:lnR>
+                    <a:lnT w="9525" cap="flat" cmpd="sng" algn="ctr">
+                      <a:solidFill>
+                        <a:srgbClr val="9E9E9E"/>
+                      </a:solidFill>
+                      <a:prstDash val="solid"/>
+                      <a:round/>
+                      <a:headEnd type="none" w="med" len="med"/>
+                      <a:tailEnd type="none" w="med" len="med"/>
+                    </a:lnT>
+                    <a:lnB w="9525" cap="flat" cmpd="sng" algn="ctr">
+                      <a:solidFill>
+                        <a:srgbClr val="9E9E9E"/>
+                      </a:solidFill>
+                      <a:prstDash val="solid"/>
+                      <a:round/>
+                      <a:headEnd type="none" w="med" len="med"/>
+                      <a:tailEnd type="none" w="med" len="med"/>
+                    </a:lnB>
+                    <a:solidFill>
+                      <a:srgbClr val="FFE5B4"/>
+                    </a:solidFill>
+                  </a:tcPr>
+                </a:tc>
+                <a:tc>
+                  <a:txBody>
+                    <a:bodyPr/>
+                    <a:lstStyle/>
+                    <a:p>
+                      <a:pPr algn="l" fontAlgn="base">
+                        <a:buNone/>
+                      </a:pPr>
+                      <a:r>
+                        <a:rPr lang="en-IN" sz="600" b="0" dirty="0">
+                          <a:solidFill>
+                            <a:schemeClr val="tx1"/>
+                          </a:solidFill>
+                          <a:effectLst/>
+                          <a:latin typeface="Calibri" panose="020F0502020204030204" pitchFamily="34" charset="0"/>
+                          <a:ea typeface="Calibri" panose="020F0502020204030204" pitchFamily="34" charset="0"/>
+                          <a:cs typeface="Calibri" panose="020F0502020204030204" pitchFamily="34" charset="0"/>
+                        </a:rPr>
+                        <a:t>{{pat_fy26}}</a:t>
+                      </a:r>
+                    </a:p>
+                  </a:txBody>
+                  <a:tcPr anchor="ctr">
+                    <a:lnL w="9525" cap="flat" cmpd="sng" algn="ctr">
+                      <a:solidFill>
+                        <a:srgbClr val="9E9E9E"/>
+                      </a:solidFill>
+                      <a:prstDash val="solid"/>
+                      <a:round/>
+                      <a:headEnd type="none" w="med" len="med"/>
+                      <a:tailEnd type="none" w="med" len="med"/>
+                    </a:lnL>
+                    <a:lnR w="9525" cap="flat" cmpd="sng" algn="ctr">
+                      <a:solidFill>
+                        <a:srgbClr val="9E9E9E"/>
+                      </a:solidFill>
+                      <a:prstDash val="solid"/>
+                      <a:round/>
+                      <a:headEnd type="none" w="med" len="med"/>
+                      <a:tailEnd type="none" w="med" len="med"/>
+                    </a:lnR>
+                    <a:lnT w="9525" cap="flat" cmpd="sng" algn="ctr">
+                      <a:solidFill>
+                        <a:srgbClr val="9E9E9E"/>
+                      </a:solidFill>
+                      <a:prstDash val="solid"/>
+                      <a:round/>
+                      <a:headEnd type="none" w="med" len="med"/>
+                      <a:tailEnd type="none" w="med" len="med"/>
+                    </a:lnT>
+                    <a:lnB w="9525" cap="flat" cmpd="sng" algn="ctr">
+                      <a:solidFill>
+                        <a:srgbClr val="9E9E9E"/>
+                      </a:solidFill>
+                      <a:prstDash val="solid"/>
+                      <a:round/>
+                      <a:headEnd type="none" w="med" len="med"/>
+                      <a:tailEnd type="none" w="med" len="med"/>
+                    </a:lnB>
+                    <a:solidFill>
+                      <a:srgbClr val="FFE5B4"/>
+                    </a:solidFill>
+                  </a:tcPr>
+                </a:tc>
+                <a:tc>
+                  <a:txBody>
+                    <a:bodyPr/>
+                    <a:lstStyle/>
+                    <a:p>
+                      <a:pPr algn="l" fontAlgn="base">
+                        <a:buNone/>
+                      </a:pPr>
+                      <a:r>
+                        <a:rPr lang="en-IN" sz="600" b="0" dirty="0">
+                          <a:solidFill>
+                            <a:schemeClr val="tx1"/>
+                          </a:solidFill>
+                          <a:effectLst/>
+                          <a:latin typeface="Calibri" panose="020F0502020204030204" pitchFamily="34" charset="0"/>
+                          <a:ea typeface="Calibri" panose="020F0502020204030204" pitchFamily="34" charset="0"/>
+                          <a:cs typeface="Calibri" panose="020F0502020204030204" pitchFamily="34" charset="0"/>
+                        </a:rPr>
+                        <a:t>{{pat_fy27}}</a:t>
+                      </a:r>
+                    </a:p>
+                  </a:txBody>
+                  <a:tcPr anchor="ctr">
+                    <a:lnL w="9525" cap="flat" cmpd="sng" algn="ctr">
+                      <a:solidFill>
+                        <a:srgbClr val="9E9E9E"/>
+                      </a:solidFill>
+                      <a:prstDash val="solid"/>
+                      <a:round/>
+                      <a:headEnd type="none" w="med" len="med"/>
+                      <a:tailEnd type="none" w="med" len="med"/>
+                    </a:lnL>
+                    <a:lnR w="9525" cap="flat" cmpd="sng" algn="ctr">
+                      <a:solidFill>
+                        <a:srgbClr val="9E9E9E"/>
+                      </a:solidFill>
+                      <a:prstDash val="solid"/>
+                      <a:round/>
+                      <a:headEnd type="none" w="med" len="med"/>
+                      <a:tailEnd type="none" w="med" len="med"/>
+                    </a:lnR>
+                    <a:lnT w="9525" cap="flat" cmpd="sng" algn="ctr">
+                      <a:solidFill>
+                        <a:srgbClr val="9E9E9E"/>
+                      </a:solidFill>
+                      <a:prstDash val="solid"/>
+                      <a:round/>
+                      <a:headEnd type="none" w="med" len="med"/>
+                      <a:tailEnd type="none" w="med" len="med"/>
+                    </a:lnT>
+                    <a:lnB w="9525" cap="flat" cmpd="sng" algn="ctr">
+                      <a:solidFill>
+                        <a:srgbClr val="9E9E9E"/>
+                      </a:solidFill>
+                      <a:prstDash val="solid"/>
+                      <a:round/>
+                      <a:headEnd type="none" w="med" len="med"/>
+                      <a:tailEnd type="none" w="med" len="med"/>
+                    </a:lnB>
+                    <a:solidFill>
+                      <a:srgbClr val="FFE5B4"/>
+                    </a:solidFill>
+                  </a:tcPr>
+                </a:tc>
+                <a:tc>
+                  <a:txBody>
+                    <a:bodyPr/>
+                    <a:lstStyle/>
+                    <a:p>
+                      <a:pPr algn="l" fontAlgn="base">
+                        <a:buNone/>
+                      </a:pPr>
+                      <a:r>
+                        <a:rPr lang="en-IN" sz="600" b="0" dirty="0">
+                          <a:solidFill>
+                            <a:schemeClr val="tx1"/>
+                          </a:solidFill>
+                          <a:effectLst/>
+                          <a:latin typeface="Calibri" panose="020F0502020204030204" pitchFamily="34" charset="0"/>
+                          <a:ea typeface="Calibri" panose="020F0502020204030204" pitchFamily="34" charset="0"/>
+                          <a:cs typeface="Calibri" panose="020F0502020204030204" pitchFamily="34" charset="0"/>
+                        </a:rPr>
+                        <a:t>{{pat_fy28}}</a:t>
+                      </a:r>
+                    </a:p>
+                  </a:txBody>
+                  <a:tcPr anchor="ctr">
+                    <a:lnL w="9525" cap="flat" cmpd="sng" algn="ctr">
+                      <a:solidFill>
+                        <a:srgbClr val="9E9E9E"/>
+                      </a:solidFill>
+                      <a:prstDash val="solid"/>
+                      <a:round/>
+                      <a:headEnd type="none" w="med" len="med"/>
+                      <a:tailEnd type="none" w="med" len="med"/>
+                    </a:lnL>
+                    <a:lnR w="9525" cap="flat" cmpd="sng" algn="ctr">
+                      <a:solidFill>
+                        <a:srgbClr val="9E9E9E"/>
+                      </a:solidFill>
+                      <a:prstDash val="solid"/>
+                      <a:round/>
+                      <a:headEnd type="none" w="med" len="med"/>
+                      <a:tailEnd type="none" w="med" len="med"/>
+                    </a:lnR>
+                    <a:lnT w="9525" cap="flat" cmpd="sng" algn="ctr">
+                      <a:solidFill>
+                        <a:srgbClr val="9E9E9E"/>
+                      </a:solidFill>
+                      <a:prstDash val="solid"/>
+                      <a:round/>
+                      <a:headEnd type="none" w="med" len="med"/>
+                      <a:tailEnd type="none" w="med" len="med"/>
+                    </a:lnT>
+                    <a:lnB w="9525" cap="flat" cmpd="sng" algn="ctr">
+                      <a:solidFill>
+                        <a:srgbClr val="9E9E9E"/>
+                      </a:solidFill>
+                      <a:prstDash val="solid"/>
+                      <a:round/>
+                      <a:headEnd type="none" w="med" len="med"/>
+                      <a:tailEnd type="none" w="med" len="med"/>
+                    </a:lnB>
+                    <a:solidFill>
+                      <a:srgbClr val="FFE5B4"/>
+                    </a:solidFill>
+                  </a:tcPr>
+                </a:tc>
+                <a:extLst>
+                  <a:ext uri="{0D108BD9-81ED-4DB2-BD59-A6C34878D82A}">
+                    <a16:rowId xmlns:a16="http://schemas.microsoft.com/office/drawing/2014/main" val="1169337383"/>
+                  </a:ext>
+                </a:extLst>
+              </a:tr>
+              <a:tr h="335300">
+                <a:tc>
+                  <a:txBody>
+                    <a:bodyPr/>
+                    <a:lstStyle/>
+                    <a:p>
+                      <a:pPr rtl="0" fontAlgn="t">
+                        <a:buNone/>
+                      </a:pPr>
+                      <a:r>
+                        <a:rPr lang="en-IN" sz="600" b="0" i="0" u="none" strike="noStrike">
+                          <a:solidFill>
+                            <a:schemeClr val="tx1"/>
+                          </a:solidFill>
+                          <a:effectLst/>
+                          <a:latin typeface="Calibri" panose="020F0502020204030204" pitchFamily="34" charset="0"/>
+                        </a:rPr>
+                        <a:t>YoY% growth</a:t>
+                      </a:r>
+                      <a:endParaRPr lang="en-IN">
+                        <a:solidFill>
+                          <a:schemeClr val="tx1"/>
+                        </a:solidFill>
+                        <a:effectLst/>
+                      </a:endParaRPr>
+                    </a:p>
+                  </a:txBody>
+                  <a:tcPr marL="95250" marR="95250" marT="95250" marB="95250">
+                    <a:lnL w="9525" cap="flat" cmpd="sng" algn="ctr">
+                      <a:solidFill>
+                        <a:srgbClr val="9E9E9E"/>
+                      </a:solidFill>
+                      <a:prstDash val="solid"/>
+                      <a:round/>
+                      <a:headEnd type="none" w="med" len="med"/>
+                      <a:tailEnd type="none" w="med" len="med"/>
+                    </a:lnL>
+                    <a:lnR w="9525" cap="flat" cmpd="sng" algn="ctr">
+                      <a:solidFill>
+                        <a:srgbClr val="9E9E9E"/>
+                      </a:solidFill>
+                      <a:prstDash val="solid"/>
+                      <a:round/>
+                      <a:headEnd type="none" w="med" len="med"/>
+                      <a:tailEnd type="none" w="med" len="med"/>
+                    </a:lnR>
+                    <a:lnT w="9525" cap="flat" cmpd="sng" algn="ctr">
+                      <a:solidFill>
+                        <a:srgbClr val="9E9E9E"/>
+                      </a:solidFill>
+                      <a:prstDash val="solid"/>
+                      <a:round/>
+                      <a:headEnd type="none" w="med" len="med"/>
+                      <a:tailEnd type="none" w="med" len="med"/>
+                    </a:lnT>
+                    <a:lnB w="9525" cap="flat" cmpd="sng" algn="ctr">
+                      <a:solidFill>
+                        <a:srgbClr val="9E9E9E"/>
+                      </a:solidFill>
+                      <a:prstDash val="solid"/>
+                      <a:round/>
+                      <a:headEnd type="none" w="med" len="med"/>
+                      <a:tailEnd type="none" w="med" len="med"/>
+                    </a:lnB>
+                    <a:noFill/>
+                  </a:tcPr>
+                </a:tc>
+                <a:tc>
+                  <a:txBody>
+                    <a:bodyPr/>
+                    <a:lstStyle/>
+                    <a:p>
+                      <a:pPr algn="l" fontAlgn="base">
+                        <a:buNone/>
+                      </a:pPr>
+                      <a:r>
+                        <a:rPr lang="en-IN" sz="600" b="0" dirty="0">
+                          <a:solidFill>
+                            <a:schemeClr val="tx1"/>
+                          </a:solidFill>
+                          <a:effectLst/>
+                          <a:latin typeface="SF Mono"/>
+                        </a:rPr>
+                        <a:t>{{pat_growth_fy24}}</a:t>
+                      </a:r>
+                    </a:p>
+                  </a:txBody>
+                  <a:tcPr anchor="ctr">
+                    <a:lnL w="9525" cap="flat" cmpd="sng" algn="ctr">
+                      <a:solidFill>
+                        <a:srgbClr val="9E9E9E"/>
+                      </a:solidFill>
+                      <a:prstDash val="solid"/>
+                      <a:round/>
+                      <a:headEnd type="none" w="med" len="med"/>
+                      <a:tailEnd type="none" w="med" len="med"/>
+                    </a:lnL>
+                    <a:lnR w="9525" cap="flat" cmpd="sng" algn="ctr">
+                      <a:solidFill>
+                        <a:srgbClr val="9E9E9E"/>
+                      </a:solidFill>
+                      <a:prstDash val="solid"/>
+                      <a:round/>
+                      <a:headEnd type="none" w="med" len="med"/>
+                      <a:tailEnd type="none" w="med" len="med"/>
+                    </a:lnR>
+                    <a:lnT w="9525" cap="flat" cmpd="sng" algn="ctr">
+                      <a:solidFill>
+                        <a:srgbClr val="9E9E9E"/>
+                      </a:solidFill>
+                      <a:prstDash val="solid"/>
+                      <a:round/>
+                      <a:headEnd type="none" w="med" len="med"/>
+                      <a:tailEnd type="none" w="med" len="med"/>
+                    </a:lnT>
+                    <a:lnB w="9525" cap="flat" cmpd="sng" algn="ctr">
+                      <a:solidFill>
+                        <a:srgbClr val="9E9E9E"/>
+                      </a:solidFill>
+                      <a:prstDash val="solid"/>
+                      <a:round/>
+                      <a:headEnd type="none" w="med" len="med"/>
+                      <a:tailEnd type="none" w="med" len="med"/>
+                    </a:lnB>
+                    <a:noFill/>
+                  </a:tcPr>
+                </a:tc>
+                <a:tc>
+                  <a:txBody>
+                    <a:bodyPr/>
+                    <a:lstStyle/>
+                    <a:p>
+                      <a:pPr algn="l" fontAlgn="base">
+                        <a:buNone/>
+                      </a:pPr>
+                      <a:r>
+                        <a:rPr lang="en-IN" sz="600" b="0">
+                          <a:solidFill>
+                            <a:schemeClr val="tx1"/>
+                          </a:solidFill>
+                          <a:effectLst/>
+                          <a:latin typeface="SF Mono"/>
+                        </a:rPr>
+                        <a:t>{{pat_growth_fy25}}</a:t>
+                      </a:r>
+                    </a:p>
+                  </a:txBody>
+                  <a:tcPr anchor="ctr">
+                    <a:lnL w="9525" cap="flat" cmpd="sng" algn="ctr">
+                      <a:solidFill>
+                        <a:srgbClr val="9E9E9E"/>
+                      </a:solidFill>
+                      <a:prstDash val="solid"/>
+                      <a:round/>
+                      <a:headEnd type="none" w="med" len="med"/>
+                      <a:tailEnd type="none" w="med" len="med"/>
+                    </a:lnL>
+                    <a:lnR w="9525" cap="flat" cmpd="sng" algn="ctr">
+                      <a:solidFill>
+                        <a:srgbClr val="9E9E9E"/>
+                      </a:solidFill>
+                      <a:prstDash val="solid"/>
+                      <a:round/>
+                      <a:headEnd type="none" w="med" len="med"/>
+                      <a:tailEnd type="none" w="med" len="med"/>
+                    </a:lnR>
+                    <a:lnT w="9525" cap="flat" cmpd="sng" algn="ctr">
+                      <a:solidFill>
+                        <a:srgbClr val="9E9E9E"/>
+                      </a:solidFill>
+                      <a:prstDash val="solid"/>
+                      <a:round/>
+                      <a:headEnd type="none" w="med" len="med"/>
+                      <a:tailEnd type="none" w="med" len="med"/>
+                    </a:lnT>
+                    <a:lnB w="9525" cap="flat" cmpd="sng" algn="ctr">
+                      <a:solidFill>
+                        <a:srgbClr val="9E9E9E"/>
+                      </a:solidFill>
+                      <a:prstDash val="solid"/>
+                      <a:round/>
+                      <a:headEnd type="none" w="med" len="med"/>
+                      <a:tailEnd type="none" w="med" len="med"/>
+                    </a:lnB>
+                    <a:noFill/>
+                  </a:tcPr>
+                </a:tc>
+                <a:tc>
+                  <a:txBody>
+                    <a:bodyPr/>
+                    <a:lstStyle/>
+                    <a:p>
+                      <a:pPr algn="l" fontAlgn="base">
+                        <a:buNone/>
+                      </a:pPr>
+                      <a:r>
+                        <a:rPr lang="en-IN" sz="600" b="0" dirty="0">
+                          <a:solidFill>
+                            <a:schemeClr val="tx1"/>
+                          </a:solidFill>
+                          <a:effectLst/>
+                          <a:latin typeface="SF Mono"/>
+                        </a:rPr>
+                        <a:t>{{pat_growth_fy26}}</a:t>
+                      </a:r>
+                    </a:p>
+                  </a:txBody>
+                  <a:tcPr anchor="ctr">
+                    <a:lnL w="9525" cap="flat" cmpd="sng" algn="ctr">
+                      <a:solidFill>
+                        <a:srgbClr val="9E9E9E"/>
+                      </a:solidFill>
+                      <a:prstDash val="solid"/>
+                      <a:round/>
+                      <a:headEnd type="none" w="med" len="med"/>
+                      <a:tailEnd type="none" w="med" len="med"/>
+                    </a:lnL>
+                    <a:lnR w="9525" cap="flat" cmpd="sng" algn="ctr">
+                      <a:solidFill>
+                        <a:srgbClr val="9E9E9E"/>
+                      </a:solidFill>
+                      <a:prstDash val="solid"/>
+                      <a:round/>
+                      <a:headEnd type="none" w="med" len="med"/>
+                      <a:tailEnd type="none" w="med" len="med"/>
+                    </a:lnR>
+                    <a:lnT w="9525" cap="flat" cmpd="sng" algn="ctr">
+                      <a:solidFill>
+                        <a:srgbClr val="9E9E9E"/>
+                      </a:solidFill>
+                      <a:prstDash val="solid"/>
+                      <a:round/>
+                      <a:headEnd type="none" w="med" len="med"/>
+                      <a:tailEnd type="none" w="med" len="med"/>
+                    </a:lnT>
+                    <a:lnB w="9525" cap="flat" cmpd="sng" algn="ctr">
+                      <a:solidFill>
+                        <a:srgbClr val="9E9E9E"/>
+                      </a:solidFill>
+                      <a:prstDash val="solid"/>
+                      <a:round/>
+                      <a:headEnd type="none" w="med" len="med"/>
+                      <a:tailEnd type="none" w="med" len="med"/>
+                    </a:lnB>
+                    <a:noFill/>
+                  </a:tcPr>
+                </a:tc>
+                <a:tc>
+                  <a:txBody>
+                    <a:bodyPr/>
+                    <a:lstStyle/>
+                    <a:p>
+                      <a:pPr algn="l" fontAlgn="base">
+                        <a:buNone/>
+                      </a:pPr>
+                      <a:r>
+                        <a:rPr lang="en-IN" sz="600" b="0" dirty="0">
+                          <a:solidFill>
+                            <a:schemeClr val="tx1"/>
+                          </a:solidFill>
+                          <a:effectLst/>
+                          <a:latin typeface="SF Mono"/>
+                        </a:rPr>
+                        <a:t>{{pat_growth_fy27}}</a:t>
+                      </a:r>
+                    </a:p>
+                  </a:txBody>
+                  <a:tcPr anchor="ctr">
+                    <a:lnL w="9525" cap="flat" cmpd="sng" algn="ctr">
+                      <a:solidFill>
+                        <a:srgbClr val="9E9E9E"/>
+                      </a:solidFill>
+                      <a:prstDash val="solid"/>
+                      <a:round/>
+                      <a:headEnd type="none" w="med" len="med"/>
+                      <a:tailEnd type="none" w="med" len="med"/>
+                    </a:lnL>
+                    <a:lnR w="9525" cap="flat" cmpd="sng" algn="ctr">
+                      <a:solidFill>
+                        <a:srgbClr val="9E9E9E"/>
+                      </a:solidFill>
+                      <a:prstDash val="solid"/>
+                      <a:round/>
+                      <a:headEnd type="none" w="med" len="med"/>
+                      <a:tailEnd type="none" w="med" len="med"/>
+                    </a:lnR>
+                    <a:lnT w="9525" cap="flat" cmpd="sng" algn="ctr">
+                      <a:solidFill>
+                        <a:srgbClr val="9E9E9E"/>
+                      </a:solidFill>
+                      <a:prstDash val="solid"/>
+                      <a:round/>
+                      <a:headEnd type="none" w="med" len="med"/>
+                      <a:tailEnd type="none" w="med" len="med"/>
+                    </a:lnT>
+                    <a:lnB w="9525" cap="flat" cmpd="sng" algn="ctr">
+                      <a:solidFill>
+                        <a:srgbClr val="9E9E9E"/>
+                      </a:solidFill>
+                      <a:prstDash val="solid"/>
+                      <a:round/>
+                      <a:headEnd type="none" w="med" len="med"/>
+                      <a:tailEnd type="none" w="med" len="med"/>
+                    </a:lnB>
+                    <a:noFill/>
+                  </a:tcPr>
+                </a:tc>
+                <a:tc>
+                  <a:txBody>
+                    <a:bodyPr/>
+                    <a:lstStyle/>
+                    <a:p>
+                      <a:pPr algn="l" fontAlgn="base">
+                        <a:buNone/>
+                      </a:pPr>
+                      <a:r>
+                        <a:rPr lang="en-IN" sz="600" b="0" dirty="0">
+                          <a:solidFill>
+                            <a:schemeClr val="tx1"/>
+                          </a:solidFill>
+                          <a:effectLst/>
+                          <a:latin typeface="SF Mono"/>
+                        </a:rPr>
+                        <a:t>{{pat_growth_fy28}}</a:t>
+                      </a:r>
+                    </a:p>
+                  </a:txBody>
+                  <a:tcPr anchor="ctr">
+                    <a:lnL w="9525" cap="flat" cmpd="sng" algn="ctr">
+                      <a:solidFill>
+                        <a:srgbClr val="9E9E9E"/>
+                      </a:solidFill>
+                      <a:prstDash val="solid"/>
+                      <a:round/>
+                      <a:headEnd type="none" w="med" len="med"/>
+                      <a:tailEnd type="none" w="med" len="med"/>
+                    </a:lnL>
+                    <a:lnR w="9525" cap="flat" cmpd="sng" algn="ctr">
+                      <a:solidFill>
+                        <a:srgbClr val="9E9E9E"/>
+                      </a:solidFill>
+                      <a:prstDash val="solid"/>
+                      <a:round/>
+                      <a:headEnd type="none" w="med" len="med"/>
+                      <a:tailEnd type="none" w="med" len="med"/>
+                    </a:lnR>
+                    <a:lnT w="9525" cap="flat" cmpd="sng" algn="ctr">
+                      <a:solidFill>
+                        <a:srgbClr val="9E9E9E"/>
+                      </a:solidFill>
+                      <a:prstDash val="solid"/>
+                      <a:round/>
+                      <a:headEnd type="none" w="med" len="med"/>
+                      <a:tailEnd type="none" w="med" len="med"/>
+                    </a:lnT>
+                    <a:lnB w="9525" cap="flat" cmpd="sng" algn="ctr">
+                      <a:solidFill>
+                        <a:srgbClr val="9E9E9E"/>
+                      </a:solidFill>
+                      <a:prstDash val="solid"/>
+                      <a:round/>
+                      <a:headEnd type="none" w="med" len="med"/>
+                      <a:tailEnd type="none" w="med" len="med"/>
+                    </a:lnB>
+                    <a:noFill/>
+                  </a:tcPr>
+                </a:tc>
+                <a:extLst>
+                  <a:ext uri="{0D108BD9-81ED-4DB2-BD59-A6C34878D82A}">
+                    <a16:rowId xmlns:a16="http://schemas.microsoft.com/office/drawing/2014/main" val="800111829"/>
+                  </a:ext>
+                </a:extLst>
+              </a:tr>
+              <a:tr h="273457">
+                <a:tc>
+                  <a:txBody>
+                    <a:bodyPr/>
+                    <a:lstStyle/>
+                    <a:p>
+                      <a:pPr rtl="0" fontAlgn="t">
+                        <a:buNone/>
+                      </a:pPr>
+                      <a:r>
+                        <a:rPr lang="en-IN" sz="600" b="0" i="0" u="none" strike="noStrike">
+                          <a:solidFill>
+                            <a:schemeClr val="tx1"/>
+                          </a:solidFill>
+                          <a:effectLst/>
+                          <a:latin typeface="Calibri" panose="020F0502020204030204" pitchFamily="34" charset="0"/>
+                        </a:rPr>
+                        <a:t>P/E</a:t>
+                      </a:r>
+                      <a:endParaRPr lang="en-IN">
+                        <a:solidFill>
+                          <a:schemeClr val="tx1"/>
+                        </a:solidFill>
+                        <a:effectLst/>
+                      </a:endParaRPr>
+                    </a:p>
+                  </a:txBody>
+                  <a:tcPr marL="95250" marR="95250" marT="95250" marB="95250">
+                    <a:lnL w="9525" cap="flat" cmpd="sng" algn="ctr">
+                      <a:solidFill>
+                        <a:srgbClr val="9E9E9E"/>
+                      </a:solidFill>
+                      <a:prstDash val="solid"/>
+                      <a:round/>
+                      <a:headEnd type="none" w="med" len="med"/>
+                      <a:tailEnd type="none" w="med" len="med"/>
+                    </a:lnL>
+                    <a:lnR w="9525" cap="flat" cmpd="sng" algn="ctr">
+                      <a:solidFill>
+                        <a:srgbClr val="9E9E9E"/>
+                      </a:solidFill>
+                      <a:prstDash val="solid"/>
+                      <a:round/>
+                      <a:headEnd type="none" w="med" len="med"/>
+                      <a:tailEnd type="none" w="med" len="med"/>
+                    </a:lnR>
+                    <a:lnT w="9525" cap="flat" cmpd="sng" algn="ctr">
+                      <a:solidFill>
+                        <a:srgbClr val="9E9E9E"/>
+                      </a:solidFill>
+                      <a:prstDash val="solid"/>
+                      <a:round/>
+                      <a:headEnd type="none" w="med" len="med"/>
+                      <a:tailEnd type="none" w="med" len="med"/>
+                    </a:lnT>
+                    <a:lnB w="9525" cap="flat" cmpd="sng" algn="ctr">
+                      <a:solidFill>
+                        <a:srgbClr val="9E9E9E"/>
+                      </a:solidFill>
+                      <a:prstDash val="solid"/>
+                      <a:round/>
+                      <a:headEnd type="none" w="med" len="med"/>
+                      <a:tailEnd type="none" w="med" len="med"/>
+                    </a:lnB>
+                    <a:solidFill>
+                      <a:srgbClr val="FFE5B4"/>
+                    </a:solidFill>
+                  </a:tcPr>
+                </a:tc>
+                <a:tc>
+                  <a:txBody>
+                    <a:bodyPr/>
+                    <a:lstStyle/>
+                    <a:p>
+                      <a:pPr algn="l" fontAlgn="base">
+                        <a:buNone/>
+                      </a:pPr>
+                      <a:r>
+                        <a:rPr lang="en-IN" sz="600" b="0">
+                          <a:solidFill>
+                            <a:schemeClr val="tx1"/>
+                          </a:solidFill>
+                          <a:effectLst/>
+                          <a:latin typeface="SF Mono"/>
+                        </a:rPr>
+                        <a:t>{{pe_fy24}}</a:t>
+                      </a:r>
+                    </a:p>
+                  </a:txBody>
+                  <a:tcPr anchor="ctr">
+                    <a:lnL w="9525" cap="flat" cmpd="sng" algn="ctr">
+                      <a:solidFill>
+                        <a:srgbClr val="9E9E9E"/>
+                      </a:solidFill>
+                      <a:prstDash val="solid"/>
+                      <a:round/>
+                      <a:headEnd type="none" w="med" len="med"/>
+                      <a:tailEnd type="none" w="med" len="med"/>
+                    </a:lnL>
+                    <a:lnR w="9525" cap="flat" cmpd="sng" algn="ctr">
+                      <a:solidFill>
+                        <a:srgbClr val="9E9E9E"/>
+                      </a:solidFill>
+                      <a:prstDash val="solid"/>
+                      <a:round/>
+                      <a:headEnd type="none" w="med" len="med"/>
+                      <a:tailEnd type="none" w="med" len="med"/>
+                    </a:lnR>
+                    <a:lnT w="9525" cap="flat" cmpd="sng" algn="ctr">
+                      <a:solidFill>
+                        <a:srgbClr val="9E9E9E"/>
+                      </a:solidFill>
+                      <a:prstDash val="solid"/>
+                      <a:round/>
+                      <a:headEnd type="none" w="med" len="med"/>
+                      <a:tailEnd type="none" w="med" len="med"/>
+                    </a:lnT>
+                    <a:lnB w="9525" cap="flat" cmpd="sng" algn="ctr">
+                      <a:solidFill>
+                        <a:srgbClr val="9E9E9E"/>
+                      </a:solidFill>
+                      <a:prstDash val="solid"/>
+                      <a:round/>
+                      <a:headEnd type="none" w="med" len="med"/>
+                      <a:tailEnd type="none" w="med" len="med"/>
+                    </a:lnB>
+                    <a:solidFill>
+                      <a:srgbClr val="FFE5B4"/>
+                    </a:solidFill>
+                  </a:tcPr>
+                </a:tc>
+                <a:tc>
+                  <a:txBody>
+                    <a:bodyPr/>
+                    <a:lstStyle/>
+                    <a:p>
+                      <a:pPr algn="l" fontAlgn="base">
+                        <a:buNone/>
+                      </a:pPr>
+                      <a:r>
+                        <a:rPr lang="en-IN" sz="600" b="0">
+                          <a:solidFill>
+                            <a:schemeClr val="tx1"/>
+                          </a:solidFill>
+                          <a:effectLst/>
+                          <a:latin typeface="SF Mono"/>
+                        </a:rPr>
+                        <a:t>{{pe_fy25}}</a:t>
+                      </a:r>
+                    </a:p>
+                  </a:txBody>
+                  <a:tcPr anchor="ctr">
+                    <a:lnL w="9525" cap="flat" cmpd="sng" algn="ctr">
+                      <a:solidFill>
+                        <a:srgbClr val="9E9E9E"/>
+                      </a:solidFill>
+                      <a:prstDash val="solid"/>
+                      <a:round/>
+                      <a:headEnd type="none" w="med" len="med"/>
+                      <a:tailEnd type="none" w="med" len="med"/>
+                    </a:lnL>
+                    <a:lnR w="9525" cap="flat" cmpd="sng" algn="ctr">
+                      <a:solidFill>
+                        <a:srgbClr val="9E9E9E"/>
+                      </a:solidFill>
+                      <a:prstDash val="solid"/>
+                      <a:round/>
+                      <a:headEnd type="none" w="med" len="med"/>
+                      <a:tailEnd type="none" w="med" len="med"/>
+                    </a:lnR>
+                    <a:lnT w="9525" cap="flat" cmpd="sng" algn="ctr">
+                      <a:solidFill>
+                        <a:srgbClr val="9E9E9E"/>
+                      </a:solidFill>
+                      <a:prstDash val="solid"/>
+                      <a:round/>
+                      <a:headEnd type="none" w="med" len="med"/>
+                      <a:tailEnd type="none" w="med" len="med"/>
+                    </a:lnT>
+                    <a:lnB w="9525" cap="flat" cmpd="sng" algn="ctr">
+                      <a:solidFill>
+                        <a:srgbClr val="9E9E9E"/>
+                      </a:solidFill>
+                      <a:prstDash val="solid"/>
+                      <a:round/>
+                      <a:headEnd type="none" w="med" len="med"/>
+                      <a:tailEnd type="none" w="med" len="med"/>
+                    </a:lnB>
+                    <a:solidFill>
+                      <a:srgbClr val="FFE5B4"/>
+                    </a:solidFill>
+                  </a:tcPr>
+                </a:tc>
+                <a:tc>
+                  <a:txBody>
+                    <a:bodyPr/>
+                    <a:lstStyle/>
+                    <a:p>
+                      <a:pPr algn="l" fontAlgn="base">
+                        <a:buNone/>
+                      </a:pPr>
+                      <a:r>
+                        <a:rPr lang="en-IN" sz="600" b="0">
+                          <a:solidFill>
+                            <a:schemeClr val="tx1"/>
+                          </a:solidFill>
+                          <a:effectLst/>
+                          <a:latin typeface="SF Mono"/>
+                        </a:rPr>
+                        <a:t>{{pe_fy26}}</a:t>
+                      </a:r>
+                    </a:p>
+                  </a:txBody>
+                  <a:tcPr anchor="ctr">
+                    <a:lnL w="9525" cap="flat" cmpd="sng" algn="ctr">
+                      <a:solidFill>
+                        <a:srgbClr val="9E9E9E"/>
+                      </a:solidFill>
+                      <a:prstDash val="solid"/>
+                      <a:round/>
+                      <a:headEnd type="none" w="med" len="med"/>
+                      <a:tailEnd type="none" w="med" len="med"/>
+                    </a:lnL>
+                    <a:lnR w="9525" cap="flat" cmpd="sng" algn="ctr">
+                      <a:solidFill>
+                        <a:srgbClr val="9E9E9E"/>
+                      </a:solidFill>
+                      <a:prstDash val="solid"/>
+                      <a:round/>
+                      <a:headEnd type="none" w="med" len="med"/>
+                      <a:tailEnd type="none" w="med" len="med"/>
+                    </a:lnR>
+                    <a:lnT w="9525" cap="flat" cmpd="sng" algn="ctr">
+                      <a:solidFill>
+                        <a:srgbClr val="9E9E9E"/>
+                      </a:solidFill>
+                      <a:prstDash val="solid"/>
+                      <a:round/>
+                      <a:headEnd type="none" w="med" len="med"/>
+                      <a:tailEnd type="none" w="med" len="med"/>
+                    </a:lnT>
+                    <a:lnB w="9525" cap="flat" cmpd="sng" algn="ctr">
+                      <a:solidFill>
+                        <a:srgbClr val="9E9E9E"/>
+                      </a:solidFill>
+                      <a:prstDash val="solid"/>
+                      <a:round/>
+                      <a:headEnd type="none" w="med" len="med"/>
+                      <a:tailEnd type="none" w="med" len="med"/>
+                    </a:lnB>
+                    <a:solidFill>
+                      <a:srgbClr val="FFE5B4"/>
+                    </a:solidFill>
+                  </a:tcPr>
+                </a:tc>
+                <a:tc>
+                  <a:txBody>
+                    <a:bodyPr/>
+                    <a:lstStyle/>
+                    <a:p>
+                      <a:pPr algn="l" fontAlgn="base">
+                        <a:buNone/>
+                      </a:pPr>
+                      <a:r>
+                        <a:rPr lang="en-IN" sz="600" b="0">
+                          <a:solidFill>
+                            <a:schemeClr val="tx1"/>
+                          </a:solidFill>
+                          <a:effectLst/>
+                          <a:latin typeface="SF Mono"/>
+                        </a:rPr>
+                        <a:t>{{pe_fy27}}</a:t>
+                      </a:r>
+                    </a:p>
+                  </a:txBody>
+                  <a:tcPr anchor="ctr">
+                    <a:lnL w="9525" cap="flat" cmpd="sng" algn="ctr">
+                      <a:solidFill>
+                        <a:srgbClr val="9E9E9E"/>
+                      </a:solidFill>
+                      <a:prstDash val="solid"/>
+                      <a:round/>
+                      <a:headEnd type="none" w="med" len="med"/>
+                      <a:tailEnd type="none" w="med" len="med"/>
+                    </a:lnL>
+                    <a:lnR w="9525" cap="flat" cmpd="sng" algn="ctr">
+                      <a:solidFill>
+                        <a:srgbClr val="9E9E9E"/>
+                      </a:solidFill>
+                      <a:prstDash val="solid"/>
+                      <a:round/>
+                      <a:headEnd type="none" w="med" len="med"/>
+                      <a:tailEnd type="none" w="med" len="med"/>
+                    </a:lnR>
+                    <a:lnT w="9525" cap="flat" cmpd="sng" algn="ctr">
+                      <a:solidFill>
+                        <a:srgbClr val="9E9E9E"/>
+                      </a:solidFill>
+                      <a:prstDash val="solid"/>
+                      <a:round/>
+                      <a:headEnd type="none" w="med" len="med"/>
+                      <a:tailEnd type="none" w="med" len="med"/>
+                    </a:lnT>
+                    <a:lnB w="9525" cap="flat" cmpd="sng" algn="ctr">
+                      <a:solidFill>
+                        <a:srgbClr val="9E9E9E"/>
+                      </a:solidFill>
+                      <a:prstDash val="solid"/>
+                      <a:round/>
+                      <a:headEnd type="none" w="med" len="med"/>
+                      <a:tailEnd type="none" w="med" len="med"/>
+                    </a:lnB>
+                    <a:solidFill>
+                      <a:srgbClr val="FFE5B4"/>
+                    </a:solidFill>
+                  </a:tcPr>
+                </a:tc>
+                <a:tc>
+                  <a:txBody>
+                    <a:bodyPr/>
+                    <a:lstStyle/>
+                    <a:p>
+                      <a:pPr algn="l" fontAlgn="base">
+                        <a:buNone/>
+                      </a:pPr>
+                      <a:r>
+                        <a:rPr lang="en-IN" sz="600" b="0" dirty="0">
+                          <a:solidFill>
+                            <a:schemeClr val="tx1"/>
+                          </a:solidFill>
+                          <a:effectLst/>
+                          <a:latin typeface="SF Mono"/>
+                        </a:rPr>
+                        <a:t>{{pe_fy28}}</a:t>
+                      </a:r>
+                    </a:p>
+                  </a:txBody>
+                  <a:tcPr anchor="ctr">
+                    <a:lnL w="9525" cap="flat" cmpd="sng" algn="ctr">
+                      <a:solidFill>
+                        <a:srgbClr val="9E9E9E"/>
+                      </a:solidFill>
+                      <a:prstDash val="solid"/>
+                      <a:round/>
+                      <a:headEnd type="none" w="med" len="med"/>
+                      <a:tailEnd type="none" w="med" len="med"/>
+                    </a:lnL>
+                    <a:lnR w="9525" cap="flat" cmpd="sng" algn="ctr">
+                      <a:solidFill>
+                        <a:srgbClr val="9E9E9E"/>
+                      </a:solidFill>
+                      <a:prstDash val="solid"/>
+                      <a:round/>
+                      <a:headEnd type="none" w="med" len="med"/>
+                      <a:tailEnd type="none" w="med" len="med"/>
+                    </a:lnR>
+                    <a:lnT w="9525" cap="flat" cmpd="sng" algn="ctr">
+                      <a:solidFill>
+                        <a:srgbClr val="9E9E9E"/>
+                      </a:solidFill>
+                      <a:prstDash val="solid"/>
+                      <a:round/>
+                      <a:headEnd type="none" w="med" len="med"/>
+                      <a:tailEnd type="none" w="med" len="med"/>
+                    </a:lnT>
+                    <a:lnB w="9525" cap="flat" cmpd="sng" algn="ctr">
+                      <a:solidFill>
+                        <a:srgbClr val="9E9E9E"/>
+                      </a:solidFill>
+                      <a:prstDash val="solid"/>
+                      <a:round/>
+                      <a:headEnd type="none" w="med" len="med"/>
+                      <a:tailEnd type="none" w="med" len="med"/>
+                    </a:lnB>
+                    <a:solidFill>
+                      <a:srgbClr val="FFE5B4"/>
+                    </a:solidFill>
+                  </a:tcPr>
+                </a:tc>
+                <a:extLst>
+                  <a:ext uri="{0D108BD9-81ED-4DB2-BD59-A6C34878D82A}">
+                    <a16:rowId xmlns:a16="http://schemas.microsoft.com/office/drawing/2014/main" val="2083340940"/>
+                  </a:ext>
+                </a:extLst>
+              </a:tr>
+              <a:tr h="273457">
+                <a:tc>
+                  <a:txBody>
+                    <a:bodyPr/>
+                    <a:lstStyle/>
+                    <a:p>
+                      <a:pPr rtl="0" fontAlgn="t">
+                        <a:buNone/>
+                      </a:pPr>
+                      <a:r>
+                        <a:rPr lang="en-IN" sz="600" b="0" i="0" u="none" strike="noStrike">
+                          <a:solidFill>
+                            <a:schemeClr val="tx1"/>
+                          </a:solidFill>
+                          <a:effectLst/>
+                          <a:latin typeface="Calibri" panose="020F0502020204030204" pitchFamily="34" charset="0"/>
+                        </a:rPr>
+                        <a:t>P/B</a:t>
+                      </a:r>
+                      <a:endParaRPr lang="en-IN">
+                        <a:solidFill>
+                          <a:schemeClr val="tx1"/>
+                        </a:solidFill>
+                        <a:effectLst/>
+                      </a:endParaRPr>
+                    </a:p>
+                  </a:txBody>
+                  <a:tcPr marL="95250" marR="95250" marT="95250" marB="95250">
+                    <a:lnL w="9525" cap="flat" cmpd="sng" algn="ctr">
+                      <a:solidFill>
+                        <a:srgbClr val="9E9E9E"/>
+                      </a:solidFill>
+                      <a:prstDash val="solid"/>
+                      <a:round/>
+                      <a:headEnd type="none" w="med" len="med"/>
+                      <a:tailEnd type="none" w="med" len="med"/>
+                    </a:lnL>
+                    <a:lnR w="9525" cap="flat" cmpd="sng" algn="ctr">
+                      <a:solidFill>
+                        <a:srgbClr val="9E9E9E"/>
+                      </a:solidFill>
+                      <a:prstDash val="solid"/>
+                      <a:round/>
+                      <a:headEnd type="none" w="med" len="med"/>
+                      <a:tailEnd type="none" w="med" len="med"/>
+                    </a:lnR>
+                    <a:lnT w="9525" cap="flat" cmpd="sng" algn="ctr">
+                      <a:solidFill>
+                        <a:srgbClr val="9E9E9E"/>
+                      </a:solidFill>
+                      <a:prstDash val="solid"/>
+                      <a:round/>
+                      <a:headEnd type="none" w="med" len="med"/>
+                      <a:tailEnd type="none" w="med" len="med"/>
+                    </a:lnT>
+                    <a:lnB w="9525" cap="flat" cmpd="sng" algn="ctr">
+                      <a:solidFill>
+                        <a:srgbClr val="9E9E9E"/>
+                      </a:solidFill>
+                      <a:prstDash val="solid"/>
+                      <a:round/>
+                      <a:headEnd type="none" w="med" len="med"/>
+                      <a:tailEnd type="none" w="med" len="med"/>
+                    </a:lnB>
+                    <a:noFill/>
+                  </a:tcPr>
+                </a:tc>
+                <a:tc>
+                  <a:txBody>
+                    <a:bodyPr/>
+                    <a:lstStyle/>
+                    <a:p>
+                      <a:pPr algn="l" fontAlgn="base">
+                        <a:buNone/>
+                      </a:pPr>
+                      <a:r>
+                        <a:rPr lang="en-IN" sz="600" b="0">
+                          <a:solidFill>
+                            <a:schemeClr val="tx1"/>
+                          </a:solidFill>
+                          <a:effectLst/>
+                          <a:latin typeface="SF Mono"/>
+                        </a:rPr>
+                        <a:t>{{pe_fy24}}</a:t>
+                      </a:r>
+                    </a:p>
+                  </a:txBody>
+                  <a:tcPr anchor="ctr">
+                    <a:lnL w="9525" cap="flat" cmpd="sng" algn="ctr">
+                      <a:solidFill>
+                        <a:srgbClr val="9E9E9E"/>
+                      </a:solidFill>
+                      <a:prstDash val="solid"/>
+                      <a:round/>
+                      <a:headEnd type="none" w="med" len="med"/>
+                      <a:tailEnd type="none" w="med" len="med"/>
+                    </a:lnL>
+                    <a:lnR w="9525" cap="flat" cmpd="sng" algn="ctr">
+                      <a:solidFill>
+                        <a:srgbClr val="9E9E9E"/>
+                      </a:solidFill>
+                      <a:prstDash val="solid"/>
+                      <a:round/>
+                      <a:headEnd type="none" w="med" len="med"/>
+                      <a:tailEnd type="none" w="med" len="med"/>
+                    </a:lnR>
+                    <a:lnT w="9525" cap="flat" cmpd="sng" algn="ctr">
+                      <a:solidFill>
+                        <a:srgbClr val="9E9E9E"/>
+                      </a:solidFill>
+                      <a:prstDash val="solid"/>
+                      <a:round/>
+                      <a:headEnd type="none" w="med" len="med"/>
+                      <a:tailEnd type="none" w="med" len="med"/>
+                    </a:lnT>
+                    <a:lnB w="9525" cap="flat" cmpd="sng" algn="ctr">
+                      <a:solidFill>
+                        <a:srgbClr val="9E9E9E"/>
+                      </a:solidFill>
+                      <a:prstDash val="solid"/>
+                      <a:round/>
+                      <a:headEnd type="none" w="med" len="med"/>
+                      <a:tailEnd type="none" w="med" len="med"/>
+                    </a:lnB>
+                    <a:noFill/>
+                  </a:tcPr>
+                </a:tc>
+                <a:tc>
+                  <a:txBody>
+                    <a:bodyPr/>
+                    <a:lstStyle/>
+                    <a:p>
+                      <a:pPr algn="l" fontAlgn="base">
+                        <a:buNone/>
+                      </a:pPr>
+                      <a:r>
+                        <a:rPr lang="en-IN" sz="600" b="0">
+                          <a:solidFill>
+                            <a:schemeClr val="tx1"/>
+                          </a:solidFill>
+                          <a:effectLst/>
+                          <a:latin typeface="SF Mono"/>
+                        </a:rPr>
+                        <a:t>{{pe_fy25}}</a:t>
+                      </a:r>
+                    </a:p>
+                  </a:txBody>
+                  <a:tcPr anchor="ctr">
+                    <a:lnL w="9525" cap="flat" cmpd="sng" algn="ctr">
+                      <a:solidFill>
+                        <a:srgbClr val="9E9E9E"/>
+                      </a:solidFill>
+                      <a:prstDash val="solid"/>
+                      <a:round/>
+                      <a:headEnd type="none" w="med" len="med"/>
+                      <a:tailEnd type="none" w="med" len="med"/>
+                    </a:lnL>
+                    <a:lnR w="9525" cap="flat" cmpd="sng" algn="ctr">
+                      <a:solidFill>
+                        <a:srgbClr val="9E9E9E"/>
+                      </a:solidFill>
+                      <a:prstDash val="solid"/>
+                      <a:round/>
+                      <a:headEnd type="none" w="med" len="med"/>
+                      <a:tailEnd type="none" w="med" len="med"/>
+                    </a:lnR>
+                    <a:lnT w="9525" cap="flat" cmpd="sng" algn="ctr">
+                      <a:solidFill>
+                        <a:srgbClr val="9E9E9E"/>
+                      </a:solidFill>
+                      <a:prstDash val="solid"/>
+                      <a:round/>
+                      <a:headEnd type="none" w="med" len="med"/>
+                      <a:tailEnd type="none" w="med" len="med"/>
+                    </a:lnT>
+                    <a:lnB w="9525" cap="flat" cmpd="sng" algn="ctr">
+                      <a:solidFill>
+                        <a:srgbClr val="9E9E9E"/>
+                      </a:solidFill>
+                      <a:prstDash val="solid"/>
+                      <a:round/>
+                      <a:headEnd type="none" w="med" len="med"/>
+                      <a:tailEnd type="none" w="med" len="med"/>
+                    </a:lnB>
+                    <a:noFill/>
+                  </a:tcPr>
+                </a:tc>
+                <a:tc>
+                  <a:txBody>
+                    <a:bodyPr/>
+                    <a:lstStyle/>
+                    <a:p>
+                      <a:pPr algn="l" fontAlgn="base">
+                        <a:buNone/>
+                      </a:pPr>
+                      <a:r>
+                        <a:rPr lang="en-IN" sz="600" b="0">
+                          <a:solidFill>
+                            <a:schemeClr val="tx1"/>
+                          </a:solidFill>
+                          <a:effectLst/>
+                          <a:latin typeface="SF Mono"/>
+                        </a:rPr>
+                        <a:t>{{pe_fy26}}</a:t>
+                      </a:r>
+                    </a:p>
+                  </a:txBody>
+                  <a:tcPr anchor="ctr">
+                    <a:lnL w="9525" cap="flat" cmpd="sng" algn="ctr">
+                      <a:solidFill>
+                        <a:srgbClr val="9E9E9E"/>
+                      </a:solidFill>
+                      <a:prstDash val="solid"/>
+                      <a:round/>
+                      <a:headEnd type="none" w="med" len="med"/>
+                      <a:tailEnd type="none" w="med" len="med"/>
+                    </a:lnL>
+                    <a:lnR w="9525" cap="flat" cmpd="sng" algn="ctr">
+                      <a:solidFill>
+                        <a:srgbClr val="9E9E9E"/>
+                      </a:solidFill>
+                      <a:prstDash val="solid"/>
+                      <a:round/>
+                      <a:headEnd type="none" w="med" len="med"/>
+                      <a:tailEnd type="none" w="med" len="med"/>
+                    </a:lnR>
+                    <a:lnT w="9525" cap="flat" cmpd="sng" algn="ctr">
+                      <a:solidFill>
+                        <a:srgbClr val="9E9E9E"/>
+                      </a:solidFill>
+                      <a:prstDash val="solid"/>
+                      <a:round/>
+                      <a:headEnd type="none" w="med" len="med"/>
+                      <a:tailEnd type="none" w="med" len="med"/>
+                    </a:lnT>
+                    <a:lnB w="9525" cap="flat" cmpd="sng" algn="ctr">
+                      <a:solidFill>
+                        <a:srgbClr val="9E9E9E"/>
+                      </a:solidFill>
+                      <a:prstDash val="solid"/>
+                      <a:round/>
+                      <a:headEnd type="none" w="med" len="med"/>
+                      <a:tailEnd type="none" w="med" len="med"/>
+                    </a:lnB>
+                    <a:noFill/>
+                  </a:tcPr>
+                </a:tc>
+                <a:tc>
+                  <a:txBody>
+                    <a:bodyPr/>
+                    <a:lstStyle/>
+                    <a:p>
+                      <a:pPr algn="l" fontAlgn="base">
+                        <a:buNone/>
+                      </a:pPr>
+                      <a:r>
+                        <a:rPr lang="en-IN" sz="600" b="0">
+                          <a:solidFill>
+                            <a:schemeClr val="tx1"/>
+                          </a:solidFill>
+                          <a:effectLst/>
+                          <a:latin typeface="SF Mono"/>
+                        </a:rPr>
+                        <a:t>{{pe_fy27}}</a:t>
+                      </a:r>
+                    </a:p>
+                  </a:txBody>
+                  <a:tcPr anchor="ctr">
+                    <a:lnL w="9525" cap="flat" cmpd="sng" algn="ctr">
+                      <a:solidFill>
+                        <a:srgbClr val="9E9E9E"/>
+                      </a:solidFill>
+                      <a:prstDash val="solid"/>
+                      <a:round/>
+                      <a:headEnd type="none" w="med" len="med"/>
+                      <a:tailEnd type="none" w="med" len="med"/>
+                    </a:lnL>
+                    <a:lnR w="9525" cap="flat" cmpd="sng" algn="ctr">
+                      <a:solidFill>
+                        <a:srgbClr val="9E9E9E"/>
+                      </a:solidFill>
+                      <a:prstDash val="solid"/>
+                      <a:round/>
+                      <a:headEnd type="none" w="med" len="med"/>
+                      <a:tailEnd type="none" w="med" len="med"/>
+                    </a:lnR>
+                    <a:lnT w="9525" cap="flat" cmpd="sng" algn="ctr">
+                      <a:solidFill>
+                        <a:srgbClr val="9E9E9E"/>
+                      </a:solidFill>
+                      <a:prstDash val="solid"/>
+                      <a:round/>
+                      <a:headEnd type="none" w="med" len="med"/>
+                      <a:tailEnd type="none" w="med" len="med"/>
+                    </a:lnT>
+                    <a:lnB w="9525" cap="flat" cmpd="sng" algn="ctr">
+                      <a:solidFill>
+                        <a:srgbClr val="9E9E9E"/>
+                      </a:solidFill>
+                      <a:prstDash val="solid"/>
+                      <a:round/>
+                      <a:headEnd type="none" w="med" len="med"/>
+                      <a:tailEnd type="none" w="med" len="med"/>
+                    </a:lnB>
+                    <a:noFill/>
+                  </a:tcPr>
+                </a:tc>
+                <a:tc>
+                  <a:txBody>
+                    <a:bodyPr/>
+                    <a:lstStyle/>
+                    <a:p>
+                      <a:pPr algn="l" fontAlgn="base">
+                        <a:buNone/>
+                      </a:pPr>
+                      <a:r>
+                        <a:rPr lang="en-IN" sz="600" b="0" dirty="0">
+                          <a:solidFill>
+                            <a:schemeClr val="tx1"/>
+                          </a:solidFill>
+                          <a:effectLst/>
+                          <a:latin typeface="SF Mono"/>
+                        </a:rPr>
+                        <a:t>{{pe_fy28}}</a:t>
+                      </a:r>
+                    </a:p>
+                  </a:txBody>
+                  <a:tcPr anchor="ctr">
+                    <a:lnL w="9525" cap="flat" cmpd="sng" algn="ctr">
+                      <a:solidFill>
+                        <a:srgbClr val="9E9E9E"/>
+                      </a:solidFill>
+                      <a:prstDash val="solid"/>
+                      <a:round/>
+                      <a:headEnd type="none" w="med" len="med"/>
+                      <a:tailEnd type="none" w="med" len="med"/>
+                    </a:lnL>
+                    <a:lnR w="9525" cap="flat" cmpd="sng" algn="ctr">
+                      <a:solidFill>
+                        <a:srgbClr val="9E9E9E"/>
+                      </a:solidFill>
+                      <a:prstDash val="solid"/>
+                      <a:round/>
+                      <a:headEnd type="none" w="med" len="med"/>
+                      <a:tailEnd type="none" w="med" len="med"/>
+                    </a:lnR>
+                    <a:lnT w="9525" cap="flat" cmpd="sng" algn="ctr">
+                      <a:solidFill>
+                        <a:srgbClr val="9E9E9E"/>
+                      </a:solidFill>
+                      <a:prstDash val="solid"/>
+                      <a:round/>
+                      <a:headEnd type="none" w="med" len="med"/>
+                      <a:tailEnd type="none" w="med" len="med"/>
+                    </a:lnT>
+                    <a:lnB w="9525" cap="flat" cmpd="sng" algn="ctr">
+                      <a:solidFill>
+                        <a:srgbClr val="9E9E9E"/>
+                      </a:solidFill>
+                      <a:prstDash val="solid"/>
+                      <a:round/>
+                      <a:headEnd type="none" w="med" len="med"/>
+                      <a:tailEnd type="none" w="med" len="med"/>
+                    </a:lnB>
+                    <a:noFill/>
+                  </a:tcPr>
+                </a:tc>
+                <a:extLst>
+                  <a:ext uri="{0D108BD9-81ED-4DB2-BD59-A6C34878D82A}">
+                    <a16:rowId xmlns:a16="http://schemas.microsoft.com/office/drawing/2014/main" val="2302457328"/>
+                  </a:ext>
+                </a:extLst>
+              </a:tr>
+            </a:tbl>
+          </a:graphicData>
+        </a:graphic>
+      </p:graphicFrame>
+      <p:sp>
+        <p:nvSpPr>
+          <p:cNvPr id="5" name="Rectangle 1">
+            <a:extLst>
+              <a:ext uri="{FF2B5EF4-FFF2-40B4-BE49-F238E27FC236}">
+                <a16:creationId xmlns:a16="http://schemas.microsoft.com/office/drawing/2014/main" id="{929B1D0D-74F2-EE08-7405-386A10478C29}"/>
+              </a:ext>
+            </a:extLst>
+          </p:cNvPr>
+          <p:cNvSpPr>
+            <a:spLocks noChangeArrowheads="1"/>
+          </p:cNvSpPr>
           <p:nvPr/>
         </p:nvSpPr>
-        <p:spPr>
+        <p:spPr bwMode="auto">
           <a:xfrm>
-            <a:off x="6220178" y="3454400"/>
-            <a:ext cx="1367682" cy="492443"/>
+            <a:off x="2371725" y="1450975"/>
+            <a:ext cx="9144000" cy="457200"/>
           </a:xfrm>
           <a:prstGeom prst="rect">
             <a:avLst/>
           </a:prstGeom>
           <a:noFill/>
+          <a:ln>
+            <a:noFill/>
+          </a:ln>
+          <a:effectLst/>
+          <a:extLst>
+            <a:ext uri="{909E8E84-426E-40DD-AFC4-6F175D3DCCD1}">
+              <a14:hiddenFill xmlns:a14="http://schemas.microsoft.com/office/drawing/2010/main">
+                <a:solidFill>
+                  <a:schemeClr val="accent1"/>
+                </a:solidFill>
+              </a14:hiddenFill>
+            </a:ext>
+            <a:ext uri="{91240B29-F687-4F45-9708-019B960494DF}">
+              <a14:hiddenLine xmlns:a14="http://schemas.microsoft.com/office/drawing/2010/main" w="9525">
+                <a:solidFill>
+                  <a:schemeClr val="tx1"/>
+                </a:solidFill>
+                <a:miter lim="800000"/>
+                <a:headEnd/>
+                <a:tailEnd/>
+              </a14:hiddenLine>
+            </a:ext>
+            <a:ext uri="{AF507438-7753-43E0-B8FC-AC1667EBCBE1}">
+              <a14:hiddenEffects xmlns:a14="http://schemas.microsoft.com/office/drawing/2010/main">
+                <a:effectLst>
+                  <a:outerShdw dist="35921" dir="2700000" algn="ctr" rotWithShape="0">
+                    <a:schemeClr val="bg2"/>
+                  </a:outerShdw>
+                </a:effectLst>
+              </a14:hiddenEffects>
+            </a:ext>
+          </a:extLst>
         </p:spPr>
         <p:txBody>
-          <a:bodyPr wrap="none" rtlCol="0">
+          <a:bodyPr vert="horz" wrap="none" lIns="91440" tIns="45720" rIns="91440" bIns="45720" numCol="1" anchor="ctr" anchorCtr="0" compatLnSpc="1">
+            <a:prstTxWarp prst="textNoShape">
+              <a:avLst/>
+            </a:prstTxWarp>
             <a:spAutoFit/>
           </a:bodyPr>
           <a:lstStyle/>
           <a:p>
-            <a:r>
-              <a:rPr lang="en-IN" sz="1200" dirty="0"/>
-              <a:t>{{</a:t>
-            </a:r>
-            <a:r>
-              <a:rPr lang="en-IN" sz="1200" dirty="0" err="1"/>
-              <a:t>financial_table</a:t>
-            </a:r>
-            <a:r>
-              <a:rPr lang="en-IN" sz="1200" dirty="0"/>
-              <a:t>}}</a:t>
-            </a:r>
-          </a:p>
-          <a:p>
-            <a:endParaRPr lang="en-IN" dirty="0"/>
+            <a:endParaRPr lang="en-IN"/>
           </a:p>
         </p:txBody>
       </p:sp>

</xml_diff>